<commit_message>
fix #504 - Make Demo App Apple icon transparent
</commit_message>
<xml_diff>
--- a/design/icon-template.pptx
+++ b/design/icon-template.pptx
@@ -5,8 +5,9 @@
     <p:sldMasterId id="2147483708" r:id="rId1"/>
   </p:sldMasterIdLst>
   <p:sldIdLst>
-    <p:sldId id="256" r:id="rId2"/>
-    <p:sldId id="257" r:id="rId3"/>
+    <p:sldId id="257" r:id="rId2"/>
+    <p:sldId id="256" r:id="rId3"/>
+    <p:sldId id="258" r:id="rId4"/>
   </p:sldIdLst>
   <p:sldSz cx="8999538" cy="8999538"/>
   <p:notesSz cx="6858000" cy="9144000"/>
@@ -107,7 +108,7 @@
   </p:defaultTextStyle>
   <p:extLst>
     <p:ext uri="{EFAFB233-063F-42B5-8137-9DF3F51BA10A}">
-      <p15:sldGuideLst xmlns:p15="http://schemas.microsoft.com/office/powerpoint/2012/main" xmlns=""/>
+      <p15:sldGuideLst xmlns="" xmlns:p15="http://schemas.microsoft.com/office/powerpoint/2012/main"/>
     </p:ext>
   </p:extLst>
 </p:presentation>
@@ -244,7 +245,8 @@
           <a:p>
             <a:fld id="{3C8D21C9-6065-4506-8F9A-70A9BB6917CD}" type="datetimeFigureOut">
               <a:rPr lang="de-DE" smtClean="0"/>
-              <a:t>28.02.2017</a:t>
+              <a:pPr/>
+              <a:t>09.05.2017</a:t>
             </a:fld>
             <a:endParaRPr lang="de-DE"/>
           </a:p>
@@ -286,7 +288,8 @@
           <a:p>
             <a:fld id="{71D19CC4-DE5F-4A9F-AD84-A568E8512C5E}" type="slidenum">
               <a:rPr lang="de-DE" smtClean="0"/>
-              <a:t>‹#›</a:t>
+              <a:pPr/>
+              <a:t>‹Nr.›</a:t>
             </a:fld>
             <a:endParaRPr lang="de-DE"/>
           </a:p>
@@ -295,7 +298,7 @@
     </p:spTree>
     <p:extLst>
       <p:ext uri="{BB962C8B-B14F-4D97-AF65-F5344CB8AC3E}">
-        <p14:creationId xmlns:p14="http://schemas.microsoft.com/office/powerpoint/2010/main" val="1709192064"/>
+        <p14:creationId xmlns:p14="http://schemas.microsoft.com/office/powerpoint/2010/main" xmlns="" val="1709192064"/>
       </p:ext>
     </p:extLst>
   </p:cSld>
@@ -414,7 +417,8 @@
           <a:p>
             <a:fld id="{3C8D21C9-6065-4506-8F9A-70A9BB6917CD}" type="datetimeFigureOut">
               <a:rPr lang="de-DE" smtClean="0"/>
-              <a:t>28.02.2017</a:t>
+              <a:pPr/>
+              <a:t>09.05.2017</a:t>
             </a:fld>
             <a:endParaRPr lang="de-DE"/>
           </a:p>
@@ -456,7 +460,8 @@
           <a:p>
             <a:fld id="{71D19CC4-DE5F-4A9F-AD84-A568E8512C5E}" type="slidenum">
               <a:rPr lang="de-DE" smtClean="0"/>
-              <a:t>‹#›</a:t>
+              <a:pPr/>
+              <a:t>‹Nr.›</a:t>
             </a:fld>
             <a:endParaRPr lang="de-DE"/>
           </a:p>
@@ -465,7 +470,7 @@
     </p:spTree>
     <p:extLst>
       <p:ext uri="{BB962C8B-B14F-4D97-AF65-F5344CB8AC3E}">
-        <p14:creationId xmlns:p14="http://schemas.microsoft.com/office/powerpoint/2010/main" val="3354924099"/>
+        <p14:creationId xmlns:p14="http://schemas.microsoft.com/office/powerpoint/2010/main" xmlns="" val="3354924099"/>
       </p:ext>
     </p:extLst>
   </p:cSld>
@@ -594,7 +599,8 @@
           <a:p>
             <a:fld id="{3C8D21C9-6065-4506-8F9A-70A9BB6917CD}" type="datetimeFigureOut">
               <a:rPr lang="de-DE" smtClean="0"/>
-              <a:t>28.02.2017</a:t>
+              <a:pPr/>
+              <a:t>09.05.2017</a:t>
             </a:fld>
             <a:endParaRPr lang="de-DE"/>
           </a:p>
@@ -636,7 +642,8 @@
           <a:p>
             <a:fld id="{71D19CC4-DE5F-4A9F-AD84-A568E8512C5E}" type="slidenum">
               <a:rPr lang="de-DE" smtClean="0"/>
-              <a:t>‹#›</a:t>
+              <a:pPr/>
+              <a:t>‹Nr.›</a:t>
             </a:fld>
             <a:endParaRPr lang="de-DE"/>
           </a:p>
@@ -645,7 +652,7 @@
     </p:spTree>
     <p:extLst>
       <p:ext uri="{BB962C8B-B14F-4D97-AF65-F5344CB8AC3E}">
-        <p14:creationId xmlns:p14="http://schemas.microsoft.com/office/powerpoint/2010/main" val="2018591043"/>
+        <p14:creationId xmlns:p14="http://schemas.microsoft.com/office/powerpoint/2010/main" xmlns="" val="2018591043"/>
       </p:ext>
     </p:extLst>
   </p:cSld>
@@ -764,7 +771,8 @@
           <a:p>
             <a:fld id="{3C8D21C9-6065-4506-8F9A-70A9BB6917CD}" type="datetimeFigureOut">
               <a:rPr lang="de-DE" smtClean="0"/>
-              <a:t>28.02.2017</a:t>
+              <a:pPr/>
+              <a:t>09.05.2017</a:t>
             </a:fld>
             <a:endParaRPr lang="de-DE"/>
           </a:p>
@@ -806,7 +814,8 @@
           <a:p>
             <a:fld id="{71D19CC4-DE5F-4A9F-AD84-A568E8512C5E}" type="slidenum">
               <a:rPr lang="de-DE" smtClean="0"/>
-              <a:t>‹#›</a:t>
+              <a:pPr/>
+              <a:t>‹Nr.›</a:t>
             </a:fld>
             <a:endParaRPr lang="de-DE"/>
           </a:p>
@@ -815,7 +824,7 @@
     </p:spTree>
     <p:extLst>
       <p:ext uri="{BB962C8B-B14F-4D97-AF65-F5344CB8AC3E}">
-        <p14:creationId xmlns:p14="http://schemas.microsoft.com/office/powerpoint/2010/main" val="2474642428"/>
+        <p14:creationId xmlns:p14="http://schemas.microsoft.com/office/powerpoint/2010/main" xmlns="" val="2474642428"/>
       </p:ext>
     </p:extLst>
   </p:cSld>
@@ -1008,7 +1017,8 @@
           <a:p>
             <a:fld id="{3C8D21C9-6065-4506-8F9A-70A9BB6917CD}" type="datetimeFigureOut">
               <a:rPr lang="de-DE" smtClean="0"/>
-              <a:t>28.02.2017</a:t>
+              <a:pPr/>
+              <a:t>09.05.2017</a:t>
             </a:fld>
             <a:endParaRPr lang="de-DE"/>
           </a:p>
@@ -1050,7 +1060,8 @@
           <a:p>
             <a:fld id="{71D19CC4-DE5F-4A9F-AD84-A568E8512C5E}" type="slidenum">
               <a:rPr lang="de-DE" smtClean="0"/>
-              <a:t>‹#›</a:t>
+              <a:pPr/>
+              <a:t>‹Nr.›</a:t>
             </a:fld>
             <a:endParaRPr lang="de-DE"/>
           </a:p>
@@ -1059,7 +1070,7 @@
     </p:spTree>
     <p:extLst>
       <p:ext uri="{BB962C8B-B14F-4D97-AF65-F5344CB8AC3E}">
-        <p14:creationId xmlns:p14="http://schemas.microsoft.com/office/powerpoint/2010/main" val="2387581068"/>
+        <p14:creationId xmlns:p14="http://schemas.microsoft.com/office/powerpoint/2010/main" xmlns="" val="2387581068"/>
       </p:ext>
     </p:extLst>
   </p:cSld>
@@ -1240,7 +1251,8 @@
           <a:p>
             <a:fld id="{3C8D21C9-6065-4506-8F9A-70A9BB6917CD}" type="datetimeFigureOut">
               <a:rPr lang="de-DE" smtClean="0"/>
-              <a:t>28.02.2017</a:t>
+              <a:pPr/>
+              <a:t>09.05.2017</a:t>
             </a:fld>
             <a:endParaRPr lang="de-DE"/>
           </a:p>
@@ -1282,7 +1294,8 @@
           <a:p>
             <a:fld id="{71D19CC4-DE5F-4A9F-AD84-A568E8512C5E}" type="slidenum">
               <a:rPr lang="de-DE" smtClean="0"/>
-              <a:t>‹#›</a:t>
+              <a:pPr/>
+              <a:t>‹Nr.›</a:t>
             </a:fld>
             <a:endParaRPr lang="de-DE"/>
           </a:p>
@@ -1291,7 +1304,7 @@
     </p:spTree>
     <p:extLst>
       <p:ext uri="{BB962C8B-B14F-4D97-AF65-F5344CB8AC3E}">
-        <p14:creationId xmlns:p14="http://schemas.microsoft.com/office/powerpoint/2010/main" val="1721259378"/>
+        <p14:creationId xmlns:p14="http://schemas.microsoft.com/office/powerpoint/2010/main" xmlns="" val="1721259378"/>
       </p:ext>
     </p:extLst>
   </p:cSld>
@@ -1607,7 +1620,8 @@
           <a:p>
             <a:fld id="{3C8D21C9-6065-4506-8F9A-70A9BB6917CD}" type="datetimeFigureOut">
               <a:rPr lang="de-DE" smtClean="0"/>
-              <a:t>28.02.2017</a:t>
+              <a:pPr/>
+              <a:t>09.05.2017</a:t>
             </a:fld>
             <a:endParaRPr lang="de-DE"/>
           </a:p>
@@ -1649,7 +1663,8 @@
           <a:p>
             <a:fld id="{71D19CC4-DE5F-4A9F-AD84-A568E8512C5E}" type="slidenum">
               <a:rPr lang="de-DE" smtClean="0"/>
-              <a:t>‹#›</a:t>
+              <a:pPr/>
+              <a:t>‹Nr.›</a:t>
             </a:fld>
             <a:endParaRPr lang="de-DE"/>
           </a:p>
@@ -1658,7 +1673,7 @@
     </p:spTree>
     <p:extLst>
       <p:ext uri="{BB962C8B-B14F-4D97-AF65-F5344CB8AC3E}">
-        <p14:creationId xmlns:p14="http://schemas.microsoft.com/office/powerpoint/2010/main" val="180250511"/>
+        <p14:creationId xmlns:p14="http://schemas.microsoft.com/office/powerpoint/2010/main" xmlns="" val="180250511"/>
       </p:ext>
     </p:extLst>
   </p:cSld>
@@ -1725,7 +1740,8 @@
           <a:p>
             <a:fld id="{3C8D21C9-6065-4506-8F9A-70A9BB6917CD}" type="datetimeFigureOut">
               <a:rPr lang="de-DE" smtClean="0"/>
-              <a:t>28.02.2017</a:t>
+              <a:pPr/>
+              <a:t>09.05.2017</a:t>
             </a:fld>
             <a:endParaRPr lang="de-DE"/>
           </a:p>
@@ -1767,7 +1783,8 @@
           <a:p>
             <a:fld id="{71D19CC4-DE5F-4A9F-AD84-A568E8512C5E}" type="slidenum">
               <a:rPr lang="de-DE" smtClean="0"/>
-              <a:t>‹#›</a:t>
+              <a:pPr/>
+              <a:t>‹Nr.›</a:t>
             </a:fld>
             <a:endParaRPr lang="de-DE"/>
           </a:p>
@@ -1776,7 +1793,7 @@
     </p:spTree>
     <p:extLst>
       <p:ext uri="{BB962C8B-B14F-4D97-AF65-F5344CB8AC3E}">
-        <p14:creationId xmlns:p14="http://schemas.microsoft.com/office/powerpoint/2010/main" val="2557870645"/>
+        <p14:creationId xmlns:p14="http://schemas.microsoft.com/office/powerpoint/2010/main" xmlns="" val="2557870645"/>
       </p:ext>
     </p:extLst>
   </p:cSld>
@@ -1820,7 +1837,8 @@
           <a:p>
             <a:fld id="{3C8D21C9-6065-4506-8F9A-70A9BB6917CD}" type="datetimeFigureOut">
               <a:rPr lang="de-DE" smtClean="0"/>
-              <a:t>28.02.2017</a:t>
+              <a:pPr/>
+              <a:t>09.05.2017</a:t>
             </a:fld>
             <a:endParaRPr lang="de-DE"/>
           </a:p>
@@ -1862,7 +1880,8 @@
           <a:p>
             <a:fld id="{71D19CC4-DE5F-4A9F-AD84-A568E8512C5E}" type="slidenum">
               <a:rPr lang="de-DE" smtClean="0"/>
-              <a:t>‹#›</a:t>
+              <a:pPr/>
+              <a:t>‹Nr.›</a:t>
             </a:fld>
             <a:endParaRPr lang="de-DE"/>
           </a:p>
@@ -1871,7 +1890,7 @@
     </p:spTree>
     <p:extLst>
       <p:ext uri="{BB962C8B-B14F-4D97-AF65-F5344CB8AC3E}">
-        <p14:creationId xmlns:p14="http://schemas.microsoft.com/office/powerpoint/2010/main" val="590345757"/>
+        <p14:creationId xmlns:p14="http://schemas.microsoft.com/office/powerpoint/2010/main" xmlns="" val="590345757"/>
       </p:ext>
     </p:extLst>
   </p:cSld>
@@ -2097,7 +2116,8 @@
           <a:p>
             <a:fld id="{3C8D21C9-6065-4506-8F9A-70A9BB6917CD}" type="datetimeFigureOut">
               <a:rPr lang="de-DE" smtClean="0"/>
-              <a:t>28.02.2017</a:t>
+              <a:pPr/>
+              <a:t>09.05.2017</a:t>
             </a:fld>
             <a:endParaRPr lang="de-DE"/>
           </a:p>
@@ -2139,7 +2159,8 @@
           <a:p>
             <a:fld id="{71D19CC4-DE5F-4A9F-AD84-A568E8512C5E}" type="slidenum">
               <a:rPr lang="de-DE" smtClean="0"/>
-              <a:t>‹#›</a:t>
+              <a:pPr/>
+              <a:t>‹Nr.›</a:t>
             </a:fld>
             <a:endParaRPr lang="de-DE"/>
           </a:p>
@@ -2148,7 +2169,7 @@
     </p:spTree>
     <p:extLst>
       <p:ext uri="{BB962C8B-B14F-4D97-AF65-F5344CB8AC3E}">
-        <p14:creationId xmlns:p14="http://schemas.microsoft.com/office/powerpoint/2010/main" val="3850784144"/>
+        <p14:creationId xmlns:p14="http://schemas.microsoft.com/office/powerpoint/2010/main" xmlns="" val="3850784144"/>
       </p:ext>
     </p:extLst>
   </p:cSld>
@@ -2354,7 +2375,8 @@
           <a:p>
             <a:fld id="{3C8D21C9-6065-4506-8F9A-70A9BB6917CD}" type="datetimeFigureOut">
               <a:rPr lang="de-DE" smtClean="0"/>
-              <a:t>28.02.2017</a:t>
+              <a:pPr/>
+              <a:t>09.05.2017</a:t>
             </a:fld>
             <a:endParaRPr lang="de-DE"/>
           </a:p>
@@ -2396,7 +2418,8 @@
           <a:p>
             <a:fld id="{71D19CC4-DE5F-4A9F-AD84-A568E8512C5E}" type="slidenum">
               <a:rPr lang="de-DE" smtClean="0"/>
-              <a:t>‹#›</a:t>
+              <a:pPr/>
+              <a:t>‹Nr.›</a:t>
             </a:fld>
             <a:endParaRPr lang="de-DE"/>
           </a:p>
@@ -2405,7 +2428,7 @@
     </p:spTree>
     <p:extLst>
       <p:ext uri="{BB962C8B-B14F-4D97-AF65-F5344CB8AC3E}">
-        <p14:creationId xmlns:p14="http://schemas.microsoft.com/office/powerpoint/2010/main" val="2706570782"/>
+        <p14:creationId xmlns:p14="http://schemas.microsoft.com/office/powerpoint/2010/main" xmlns="" val="2706570782"/>
       </p:ext>
     </p:extLst>
   </p:cSld>
@@ -2567,7 +2590,8 @@
           <a:p>
             <a:fld id="{3C8D21C9-6065-4506-8F9A-70A9BB6917CD}" type="datetimeFigureOut">
               <a:rPr lang="de-DE" smtClean="0"/>
-              <a:t>28.02.2017</a:t>
+              <a:pPr/>
+              <a:t>09.05.2017</a:t>
             </a:fld>
             <a:endParaRPr lang="de-DE"/>
           </a:p>
@@ -2645,7 +2669,8 @@
           <a:p>
             <a:fld id="{71D19CC4-DE5F-4A9F-AD84-A568E8512C5E}" type="slidenum">
               <a:rPr lang="de-DE" smtClean="0"/>
-              <a:t>‹#›</a:t>
+              <a:pPr/>
+              <a:t>‹Nr.›</a:t>
             </a:fld>
             <a:endParaRPr lang="de-DE"/>
           </a:p>
@@ -2654,7 +2679,7 @@
     </p:spTree>
     <p:extLst>
       <p:ext uri="{BB962C8B-B14F-4D97-AF65-F5344CB8AC3E}">
-        <p14:creationId xmlns:p14="http://schemas.microsoft.com/office/powerpoint/2010/main" val="3089234573"/>
+        <p14:creationId xmlns:p14="http://schemas.microsoft.com/office/powerpoint/2010/main" xmlns="" val="3089234573"/>
       </p:ext>
     </p:extLst>
   </p:cSld>
@@ -3755,863 +3780,6 @@
       </p:grpSp>
       <p:sp>
         <p:nvSpPr>
-          <p:cNvPr id="4" name="Abgerundetes Rechteck 3"/>
-          <p:cNvSpPr/>
-          <p:nvPr/>
-        </p:nvSpPr>
-        <p:spPr>
-          <a:xfrm>
-            <a:off x="2218205" y="640048"/>
-            <a:ext cx="4563130" cy="7719445"/>
-          </a:xfrm>
-          <a:prstGeom prst="roundRect">
-            <a:avLst>
-              <a:gd name="adj" fmla="val 11924"/>
-            </a:avLst>
-          </a:prstGeom>
-          <a:solidFill>
-            <a:schemeClr val="tx1">
-              <a:lumMod val="85000"/>
-              <a:lumOff val="15000"/>
-            </a:schemeClr>
-          </a:solidFill>
-          <a:ln>
-            <a:noFill/>
-          </a:ln>
-        </p:spPr>
-        <p:style>
-          <a:lnRef idx="2">
-            <a:schemeClr val="accent2">
-              <a:shade val="50000"/>
-            </a:schemeClr>
-          </a:lnRef>
-          <a:fillRef idx="1">
-            <a:schemeClr val="accent2"/>
-          </a:fillRef>
-          <a:effectRef idx="0">
-            <a:schemeClr val="accent2"/>
-          </a:effectRef>
-          <a:fontRef idx="minor">
-            <a:schemeClr val="lt1"/>
-          </a:fontRef>
-        </p:style>
-        <p:txBody>
-          <a:bodyPr rot="0" spcFirstLastPara="0" vertOverflow="overflow" horzOverflow="overflow" vert="horz" wrap="square" lIns="457119" tIns="228560" rIns="457119" bIns="228560" numCol="1" spcCol="0" rtlCol="0" fromWordArt="0" anchor="ctr" anchorCtr="0" forceAA="0" compatLnSpc="1">
-            <a:prstTxWarp prst="textNoShape">
-              <a:avLst/>
-            </a:prstTxWarp>
-            <a:noAutofit/>
-          </a:bodyPr>
-          <a:lstStyle/>
-          <a:p>
-            <a:pPr algn="ctr"/>
-            <a:endParaRPr lang="de-DE" sz="17000"/>
-          </a:p>
-        </p:txBody>
-      </p:sp>
-      <p:sp>
-        <p:nvSpPr>
-          <p:cNvPr id="5" name="Abgerundetes Rechteck 4"/>
-          <p:cNvSpPr/>
-          <p:nvPr/>
-        </p:nvSpPr>
-        <p:spPr>
-          <a:xfrm>
-            <a:off x="3903300" y="981479"/>
-            <a:ext cx="1192938" cy="238588"/>
-          </a:xfrm>
-          <a:prstGeom prst="roundRect">
-            <a:avLst>
-              <a:gd name="adj" fmla="val 50000"/>
-            </a:avLst>
-          </a:prstGeom>
-          <a:solidFill>
-            <a:schemeClr val="bg1">
-              <a:lumMod val="95000"/>
-            </a:schemeClr>
-          </a:solidFill>
-          <a:ln>
-            <a:noFill/>
-          </a:ln>
-        </p:spPr>
-        <p:style>
-          <a:lnRef idx="2">
-            <a:schemeClr val="accent4">
-              <a:shade val="50000"/>
-            </a:schemeClr>
-          </a:lnRef>
-          <a:fillRef idx="1">
-            <a:schemeClr val="accent4"/>
-          </a:fillRef>
-          <a:effectRef idx="0">
-            <a:schemeClr val="accent4"/>
-          </a:effectRef>
-          <a:fontRef idx="minor">
-            <a:schemeClr val="lt1"/>
-          </a:fontRef>
-        </p:style>
-        <p:txBody>
-          <a:bodyPr rot="0" spcFirstLastPara="0" vertOverflow="overflow" horzOverflow="overflow" vert="horz" wrap="square" lIns="457119" tIns="228560" rIns="457119" bIns="228560" numCol="1" spcCol="0" rtlCol="0" fromWordArt="0" anchor="ctr" anchorCtr="0" forceAA="0" compatLnSpc="1">
-            <a:prstTxWarp prst="textNoShape">
-              <a:avLst/>
-            </a:prstTxWarp>
-            <a:noAutofit/>
-          </a:bodyPr>
-          <a:lstStyle/>
-          <a:p>
-            <a:pPr algn="ctr"/>
-            <a:endParaRPr lang="de-DE" sz="17000"/>
-          </a:p>
-        </p:txBody>
-      </p:sp>
-      <p:sp>
-        <p:nvSpPr>
-          <p:cNvPr id="11" name="Abgerundetes Rechteck 10"/>
-          <p:cNvSpPr/>
-          <p:nvPr/>
-        </p:nvSpPr>
-        <p:spPr>
-          <a:xfrm>
-            <a:off x="2479728" y="1531224"/>
-            <a:ext cx="4040083" cy="5580021"/>
-          </a:xfrm>
-          <a:prstGeom prst="roundRect">
-            <a:avLst>
-              <a:gd name="adj" fmla="val 1339"/>
-            </a:avLst>
-          </a:prstGeom>
-          <a:solidFill>
-            <a:schemeClr val="bg1">
-              <a:lumMod val="95000"/>
-            </a:schemeClr>
-          </a:solidFill>
-          <a:ln>
-            <a:noFill/>
-          </a:ln>
-        </p:spPr>
-        <p:style>
-          <a:lnRef idx="2">
-            <a:schemeClr val="accent4">
-              <a:shade val="50000"/>
-            </a:schemeClr>
-          </a:lnRef>
-          <a:fillRef idx="1">
-            <a:schemeClr val="accent4"/>
-          </a:fillRef>
-          <a:effectRef idx="0">
-            <a:schemeClr val="accent4"/>
-          </a:effectRef>
-          <a:fontRef idx="minor">
-            <a:schemeClr val="lt1"/>
-          </a:fontRef>
-        </p:style>
-        <p:txBody>
-          <a:bodyPr rot="0" spcFirstLastPara="0" vertOverflow="overflow" horzOverflow="overflow" vert="horz" wrap="square" lIns="457119" tIns="228560" rIns="457119" bIns="228560" numCol="1" spcCol="0" rtlCol="0" fromWordArt="0" anchor="ctr" anchorCtr="0" forceAA="0" compatLnSpc="1">
-            <a:prstTxWarp prst="textNoShape">
-              <a:avLst/>
-            </a:prstTxWarp>
-            <a:noAutofit/>
-          </a:bodyPr>
-          <a:lstStyle/>
-          <a:p>
-            <a:pPr algn="ctr"/>
-            <a:endParaRPr lang="de-DE" sz="17000"/>
-          </a:p>
-        </p:txBody>
-      </p:sp>
-      <p:sp>
-        <p:nvSpPr>
-          <p:cNvPr id="12" name="Abgerundetes Rechteck 11"/>
-          <p:cNvSpPr/>
-          <p:nvPr/>
-        </p:nvSpPr>
-        <p:spPr>
-          <a:xfrm>
-            <a:off x="4158931" y="7381787"/>
-            <a:ext cx="681679" cy="681679"/>
-          </a:xfrm>
-          <a:prstGeom prst="roundRect">
-            <a:avLst>
-              <a:gd name="adj" fmla="val 48488"/>
-            </a:avLst>
-          </a:prstGeom>
-          <a:solidFill>
-            <a:schemeClr val="bg1">
-              <a:lumMod val="95000"/>
-            </a:schemeClr>
-          </a:solidFill>
-          <a:ln>
-            <a:noFill/>
-          </a:ln>
-        </p:spPr>
-        <p:style>
-          <a:lnRef idx="2">
-            <a:schemeClr val="accent4">
-              <a:shade val="50000"/>
-            </a:schemeClr>
-          </a:lnRef>
-          <a:fillRef idx="1">
-            <a:schemeClr val="accent4"/>
-          </a:fillRef>
-          <a:effectRef idx="0">
-            <a:schemeClr val="accent4"/>
-          </a:effectRef>
-          <a:fontRef idx="minor">
-            <a:schemeClr val="lt1"/>
-          </a:fontRef>
-        </p:style>
-        <p:txBody>
-          <a:bodyPr rot="0" spcFirstLastPara="0" vertOverflow="overflow" horzOverflow="overflow" vert="horz" wrap="square" lIns="457119" tIns="228560" rIns="457119" bIns="228560" numCol="1" spcCol="0" rtlCol="0" fromWordArt="0" anchor="ctr" anchorCtr="0" forceAA="0" compatLnSpc="1">
-            <a:prstTxWarp prst="textNoShape">
-              <a:avLst/>
-            </a:prstTxWarp>
-            <a:noAutofit/>
-          </a:bodyPr>
-          <a:lstStyle/>
-          <a:p>
-            <a:pPr algn="ctr"/>
-            <a:endParaRPr lang="de-DE" sz="17000"/>
-          </a:p>
-        </p:txBody>
-      </p:sp>
-      <p:sp>
-        <p:nvSpPr>
-          <p:cNvPr id="16" name="Abgerundetes Rechteck 15"/>
-          <p:cNvSpPr/>
-          <p:nvPr/>
-        </p:nvSpPr>
-        <p:spPr>
-          <a:xfrm>
-            <a:off x="2812846" y="1935553"/>
-            <a:ext cx="852099" cy="852099"/>
-          </a:xfrm>
-          <a:prstGeom prst="roundRect">
-            <a:avLst>
-              <a:gd name="adj" fmla="val 19115"/>
-            </a:avLst>
-          </a:prstGeom>
-          <a:solidFill>
-            <a:srgbClr val="4CD964"/>
-          </a:solidFill>
-          <a:ln>
-            <a:noFill/>
-          </a:ln>
-        </p:spPr>
-        <p:style>
-          <a:lnRef idx="2">
-            <a:schemeClr val="accent6">
-              <a:shade val="50000"/>
-            </a:schemeClr>
-          </a:lnRef>
-          <a:fillRef idx="1">
-            <a:schemeClr val="accent6"/>
-          </a:fillRef>
-          <a:effectRef idx="0">
-            <a:schemeClr val="accent6"/>
-          </a:effectRef>
-          <a:fontRef idx="minor">
-            <a:schemeClr val="lt1"/>
-          </a:fontRef>
-        </p:style>
-        <p:txBody>
-          <a:bodyPr rot="0" spcFirstLastPara="0" vertOverflow="overflow" horzOverflow="overflow" vert="horz" wrap="square" lIns="457119" tIns="228560" rIns="457119" bIns="228560" numCol="1" spcCol="0" rtlCol="0" fromWordArt="0" anchor="ctr" anchorCtr="0" forceAA="0" compatLnSpc="1">
-            <a:prstTxWarp prst="textNoShape">
-              <a:avLst/>
-            </a:prstTxWarp>
-            <a:noAutofit/>
-          </a:bodyPr>
-          <a:lstStyle/>
-          <a:p>
-            <a:pPr algn="ctr"/>
-            <a:endParaRPr lang="de-DE" sz="17000"/>
-          </a:p>
-        </p:txBody>
-      </p:sp>
-      <p:sp>
-        <p:nvSpPr>
-          <p:cNvPr id="17" name="Abgerundetes Rechteck 16"/>
-          <p:cNvSpPr/>
-          <p:nvPr/>
-        </p:nvSpPr>
-        <p:spPr>
-          <a:xfrm>
-            <a:off x="5334596" y="1935553"/>
-            <a:ext cx="852099" cy="852099"/>
-          </a:xfrm>
-          <a:prstGeom prst="roundRect">
-            <a:avLst>
-              <a:gd name="adj" fmla="val 19115"/>
-            </a:avLst>
-          </a:prstGeom>
-          <a:solidFill>
-            <a:srgbClr val="007AFF"/>
-          </a:solidFill>
-          <a:ln>
-            <a:noFill/>
-          </a:ln>
-        </p:spPr>
-        <p:style>
-          <a:lnRef idx="2">
-            <a:schemeClr val="accent6">
-              <a:shade val="50000"/>
-            </a:schemeClr>
-          </a:lnRef>
-          <a:fillRef idx="1">
-            <a:schemeClr val="accent6"/>
-          </a:fillRef>
-          <a:effectRef idx="0">
-            <a:schemeClr val="accent6"/>
-          </a:effectRef>
-          <a:fontRef idx="minor">
-            <a:schemeClr val="lt1"/>
-          </a:fontRef>
-        </p:style>
-        <p:txBody>
-          <a:bodyPr rot="0" spcFirstLastPara="0" vertOverflow="overflow" horzOverflow="overflow" vert="horz" wrap="square" lIns="457119" tIns="228560" rIns="457119" bIns="228560" numCol="1" spcCol="0" rtlCol="0" fromWordArt="0" anchor="ctr" anchorCtr="0" forceAA="0" compatLnSpc="1">
-            <a:prstTxWarp prst="textNoShape">
-              <a:avLst/>
-            </a:prstTxWarp>
-            <a:noAutofit/>
-          </a:bodyPr>
-          <a:lstStyle/>
-          <a:p>
-            <a:pPr algn="ctr"/>
-            <a:endParaRPr lang="de-DE" sz="17000"/>
-          </a:p>
-        </p:txBody>
-      </p:sp>
-      <p:sp>
-        <p:nvSpPr>
-          <p:cNvPr id="19" name="Abgerundetes Rechteck 18"/>
-          <p:cNvSpPr/>
-          <p:nvPr/>
-        </p:nvSpPr>
-        <p:spPr>
-          <a:xfrm>
-            <a:off x="4073721" y="1935553"/>
-            <a:ext cx="852099" cy="852099"/>
-          </a:xfrm>
-          <a:prstGeom prst="roundRect">
-            <a:avLst>
-              <a:gd name="adj" fmla="val 19115"/>
-            </a:avLst>
-          </a:prstGeom>
-          <a:solidFill>
-            <a:srgbClr val="FF2D55"/>
-          </a:solidFill>
-          <a:ln>
-            <a:noFill/>
-          </a:ln>
-        </p:spPr>
-        <p:style>
-          <a:lnRef idx="2">
-            <a:schemeClr val="accent6">
-              <a:shade val="50000"/>
-            </a:schemeClr>
-          </a:lnRef>
-          <a:fillRef idx="1">
-            <a:schemeClr val="accent6"/>
-          </a:fillRef>
-          <a:effectRef idx="0">
-            <a:schemeClr val="accent6"/>
-          </a:effectRef>
-          <a:fontRef idx="minor">
-            <a:schemeClr val="lt1"/>
-          </a:fontRef>
-        </p:style>
-        <p:txBody>
-          <a:bodyPr rot="0" spcFirstLastPara="0" vertOverflow="overflow" horzOverflow="overflow" vert="horz" wrap="square" lIns="457119" tIns="228560" rIns="457119" bIns="228560" numCol="1" spcCol="0" rtlCol="0" fromWordArt="0" anchor="ctr" anchorCtr="0" forceAA="0" compatLnSpc="1">
-            <a:prstTxWarp prst="textNoShape">
-              <a:avLst/>
-            </a:prstTxWarp>
-            <a:noAutofit/>
-          </a:bodyPr>
-          <a:lstStyle/>
-          <a:p>
-            <a:pPr algn="ctr"/>
-            <a:endParaRPr lang="de-DE" sz="17000"/>
-          </a:p>
-        </p:txBody>
-      </p:sp>
-      <p:sp>
-        <p:nvSpPr>
-          <p:cNvPr id="25" name="Abgerundetes Rechteck 24"/>
-          <p:cNvSpPr/>
-          <p:nvPr/>
-        </p:nvSpPr>
-        <p:spPr>
-          <a:xfrm>
-            <a:off x="2812846" y="3252778"/>
-            <a:ext cx="852099" cy="852099"/>
-          </a:xfrm>
-          <a:prstGeom prst="roundRect">
-            <a:avLst>
-              <a:gd name="adj" fmla="val 19115"/>
-            </a:avLst>
-          </a:prstGeom>
-          <a:solidFill>
-            <a:srgbClr val="FF9500"/>
-          </a:solidFill>
-          <a:ln>
-            <a:noFill/>
-          </a:ln>
-        </p:spPr>
-        <p:style>
-          <a:lnRef idx="2">
-            <a:schemeClr val="accent6">
-              <a:shade val="50000"/>
-            </a:schemeClr>
-          </a:lnRef>
-          <a:fillRef idx="1">
-            <a:schemeClr val="accent6"/>
-          </a:fillRef>
-          <a:effectRef idx="0">
-            <a:schemeClr val="accent6"/>
-          </a:effectRef>
-          <a:fontRef idx="minor">
-            <a:schemeClr val="lt1"/>
-          </a:fontRef>
-        </p:style>
-        <p:txBody>
-          <a:bodyPr rot="0" spcFirstLastPara="0" vertOverflow="overflow" horzOverflow="overflow" vert="horz" wrap="square" lIns="457119" tIns="228560" rIns="457119" bIns="228560" numCol="1" spcCol="0" rtlCol="0" fromWordArt="0" anchor="ctr" anchorCtr="0" forceAA="0" compatLnSpc="1">
-            <a:prstTxWarp prst="textNoShape">
-              <a:avLst/>
-            </a:prstTxWarp>
-            <a:noAutofit/>
-          </a:bodyPr>
-          <a:lstStyle/>
-          <a:p>
-            <a:pPr algn="ctr"/>
-            <a:endParaRPr lang="de-DE" sz="17000"/>
-          </a:p>
-        </p:txBody>
-      </p:sp>
-      <p:sp>
-        <p:nvSpPr>
-          <p:cNvPr id="26" name="Abgerundetes Rechteck 25"/>
-          <p:cNvSpPr/>
-          <p:nvPr/>
-        </p:nvSpPr>
-        <p:spPr>
-          <a:xfrm>
-            <a:off x="5334596" y="3252778"/>
-            <a:ext cx="852099" cy="852099"/>
-          </a:xfrm>
-          <a:prstGeom prst="roundRect">
-            <a:avLst>
-              <a:gd name="adj" fmla="val 19115"/>
-            </a:avLst>
-          </a:prstGeom>
-          <a:solidFill>
-            <a:srgbClr val="FF2D55"/>
-          </a:solidFill>
-          <a:ln>
-            <a:noFill/>
-          </a:ln>
-        </p:spPr>
-        <p:style>
-          <a:lnRef idx="2">
-            <a:schemeClr val="accent6">
-              <a:shade val="50000"/>
-            </a:schemeClr>
-          </a:lnRef>
-          <a:fillRef idx="1">
-            <a:schemeClr val="accent6"/>
-          </a:fillRef>
-          <a:effectRef idx="0">
-            <a:schemeClr val="accent6"/>
-          </a:effectRef>
-          <a:fontRef idx="minor">
-            <a:schemeClr val="lt1"/>
-          </a:fontRef>
-        </p:style>
-        <p:txBody>
-          <a:bodyPr rot="0" spcFirstLastPara="0" vertOverflow="overflow" horzOverflow="overflow" vert="horz" wrap="square" lIns="457119" tIns="228560" rIns="457119" bIns="228560" numCol="1" spcCol="0" rtlCol="0" fromWordArt="0" anchor="ctr" anchorCtr="0" forceAA="0" compatLnSpc="1">
-            <a:prstTxWarp prst="textNoShape">
-              <a:avLst/>
-            </a:prstTxWarp>
-            <a:noAutofit/>
-          </a:bodyPr>
-          <a:lstStyle/>
-          <a:p>
-            <a:pPr algn="ctr"/>
-            <a:endParaRPr lang="de-DE" sz="17000"/>
-          </a:p>
-        </p:txBody>
-      </p:sp>
-      <p:sp>
-        <p:nvSpPr>
-          <p:cNvPr id="27" name="Abgerundetes Rechteck 26"/>
-          <p:cNvSpPr/>
-          <p:nvPr/>
-        </p:nvSpPr>
-        <p:spPr>
-          <a:xfrm>
-            <a:off x="4073721" y="3252778"/>
-            <a:ext cx="852099" cy="852099"/>
-          </a:xfrm>
-          <a:prstGeom prst="roundRect">
-            <a:avLst>
-              <a:gd name="adj" fmla="val 19115"/>
-            </a:avLst>
-          </a:prstGeom>
-          <a:solidFill>
-            <a:srgbClr val="007AFF"/>
-          </a:solidFill>
-          <a:ln>
-            <a:noFill/>
-          </a:ln>
-        </p:spPr>
-        <p:style>
-          <a:lnRef idx="2">
-            <a:schemeClr val="accent6">
-              <a:shade val="50000"/>
-            </a:schemeClr>
-          </a:lnRef>
-          <a:fillRef idx="1">
-            <a:schemeClr val="accent6"/>
-          </a:fillRef>
-          <a:effectRef idx="0">
-            <a:schemeClr val="accent6"/>
-          </a:effectRef>
-          <a:fontRef idx="minor">
-            <a:schemeClr val="lt1"/>
-          </a:fontRef>
-        </p:style>
-        <p:txBody>
-          <a:bodyPr rot="0" spcFirstLastPara="0" vertOverflow="overflow" horzOverflow="overflow" vert="horz" wrap="square" lIns="457119" tIns="228560" rIns="457119" bIns="228560" numCol="1" spcCol="0" rtlCol="0" fromWordArt="0" anchor="ctr" anchorCtr="0" forceAA="0" compatLnSpc="1">
-            <a:prstTxWarp prst="textNoShape">
-              <a:avLst/>
-            </a:prstTxWarp>
-            <a:noAutofit/>
-          </a:bodyPr>
-          <a:lstStyle/>
-          <a:p>
-            <a:pPr algn="ctr"/>
-            <a:endParaRPr lang="de-DE" sz="17000"/>
-          </a:p>
-        </p:txBody>
-      </p:sp>
-      <p:sp>
-        <p:nvSpPr>
-          <p:cNvPr id="29" name="Abgerundetes Rechteck 28"/>
-          <p:cNvSpPr/>
-          <p:nvPr/>
-        </p:nvSpPr>
-        <p:spPr>
-          <a:xfrm>
-            <a:off x="2812846" y="4570004"/>
-            <a:ext cx="852099" cy="852099"/>
-          </a:xfrm>
-          <a:prstGeom prst="roundRect">
-            <a:avLst>
-              <a:gd name="adj" fmla="val 19115"/>
-            </a:avLst>
-          </a:prstGeom>
-          <a:solidFill>
-            <a:srgbClr val="FF2D55"/>
-          </a:solidFill>
-          <a:ln>
-            <a:noFill/>
-          </a:ln>
-        </p:spPr>
-        <p:style>
-          <a:lnRef idx="2">
-            <a:schemeClr val="accent6">
-              <a:shade val="50000"/>
-            </a:schemeClr>
-          </a:lnRef>
-          <a:fillRef idx="1">
-            <a:schemeClr val="accent6"/>
-          </a:fillRef>
-          <a:effectRef idx="0">
-            <a:schemeClr val="accent6"/>
-          </a:effectRef>
-          <a:fontRef idx="minor">
-            <a:schemeClr val="lt1"/>
-          </a:fontRef>
-        </p:style>
-        <p:txBody>
-          <a:bodyPr rot="0" spcFirstLastPara="0" vertOverflow="overflow" horzOverflow="overflow" vert="horz" wrap="square" lIns="457119" tIns="228560" rIns="457119" bIns="228560" numCol="1" spcCol="0" rtlCol="0" fromWordArt="0" anchor="ctr" anchorCtr="0" forceAA="0" compatLnSpc="1">
-            <a:prstTxWarp prst="textNoShape">
-              <a:avLst/>
-            </a:prstTxWarp>
-            <a:noAutofit/>
-          </a:bodyPr>
-          <a:lstStyle/>
-          <a:p>
-            <a:pPr algn="ctr"/>
-            <a:endParaRPr lang="de-DE" sz="17000"/>
-          </a:p>
-        </p:txBody>
-      </p:sp>
-      <p:sp>
-        <p:nvSpPr>
-          <p:cNvPr id="30" name="Abgerundetes Rechteck 29"/>
-          <p:cNvSpPr/>
-          <p:nvPr/>
-        </p:nvSpPr>
-        <p:spPr>
-          <a:xfrm>
-            <a:off x="5334596" y="4570004"/>
-            <a:ext cx="852099" cy="852099"/>
-          </a:xfrm>
-          <a:prstGeom prst="roundRect">
-            <a:avLst>
-              <a:gd name="adj" fmla="val 19115"/>
-            </a:avLst>
-          </a:prstGeom>
-          <a:solidFill>
-            <a:srgbClr val="FF9500"/>
-          </a:solidFill>
-          <a:ln>
-            <a:noFill/>
-          </a:ln>
-        </p:spPr>
-        <p:style>
-          <a:lnRef idx="2">
-            <a:schemeClr val="accent6">
-              <a:shade val="50000"/>
-            </a:schemeClr>
-          </a:lnRef>
-          <a:fillRef idx="1">
-            <a:schemeClr val="accent6"/>
-          </a:fillRef>
-          <a:effectRef idx="0">
-            <a:schemeClr val="accent6"/>
-          </a:effectRef>
-          <a:fontRef idx="minor">
-            <a:schemeClr val="lt1"/>
-          </a:fontRef>
-        </p:style>
-        <p:txBody>
-          <a:bodyPr rot="0" spcFirstLastPara="0" vertOverflow="overflow" horzOverflow="overflow" vert="horz" wrap="square" lIns="457119" tIns="228560" rIns="457119" bIns="228560" numCol="1" spcCol="0" rtlCol="0" fromWordArt="0" anchor="ctr" anchorCtr="0" forceAA="0" compatLnSpc="1">
-            <a:prstTxWarp prst="textNoShape">
-              <a:avLst/>
-            </a:prstTxWarp>
-            <a:noAutofit/>
-          </a:bodyPr>
-          <a:lstStyle/>
-          <a:p>
-            <a:pPr algn="ctr"/>
-            <a:endParaRPr lang="de-DE" sz="17000"/>
-          </a:p>
-        </p:txBody>
-      </p:sp>
-      <p:sp>
-        <p:nvSpPr>
-          <p:cNvPr id="31" name="Abgerundetes Rechteck 30"/>
-          <p:cNvSpPr/>
-          <p:nvPr/>
-        </p:nvSpPr>
-        <p:spPr>
-          <a:xfrm>
-            <a:off x="4073721" y="4570004"/>
-            <a:ext cx="852099" cy="852099"/>
-          </a:xfrm>
-          <a:prstGeom prst="roundRect">
-            <a:avLst>
-              <a:gd name="adj" fmla="val 19115"/>
-            </a:avLst>
-          </a:prstGeom>
-          <a:solidFill>
-            <a:srgbClr val="4CD964"/>
-          </a:solidFill>
-          <a:ln>
-            <a:noFill/>
-          </a:ln>
-        </p:spPr>
-        <p:style>
-          <a:lnRef idx="2">
-            <a:schemeClr val="accent6">
-              <a:shade val="50000"/>
-            </a:schemeClr>
-          </a:lnRef>
-          <a:fillRef idx="1">
-            <a:schemeClr val="accent6"/>
-          </a:fillRef>
-          <a:effectRef idx="0">
-            <a:schemeClr val="accent6"/>
-          </a:effectRef>
-          <a:fontRef idx="minor">
-            <a:schemeClr val="lt1"/>
-          </a:fontRef>
-        </p:style>
-        <p:txBody>
-          <a:bodyPr rot="0" spcFirstLastPara="0" vertOverflow="overflow" horzOverflow="overflow" vert="horz" wrap="square" lIns="457119" tIns="228560" rIns="457119" bIns="228560" numCol="1" spcCol="0" rtlCol="0" fromWordArt="0" anchor="ctr" anchorCtr="0" forceAA="0" compatLnSpc="1">
-            <a:prstTxWarp prst="textNoShape">
-              <a:avLst/>
-            </a:prstTxWarp>
-            <a:noAutofit/>
-          </a:bodyPr>
-          <a:lstStyle/>
-          <a:p>
-            <a:pPr algn="ctr"/>
-            <a:endParaRPr lang="de-DE" sz="17000"/>
-          </a:p>
-        </p:txBody>
-      </p:sp>
-      <p:sp>
-        <p:nvSpPr>
-          <p:cNvPr id="33" name="Abgerundetes Rechteck 32"/>
-          <p:cNvSpPr/>
-          <p:nvPr/>
-        </p:nvSpPr>
-        <p:spPr>
-          <a:xfrm>
-            <a:off x="2812846" y="5887231"/>
-            <a:ext cx="852099" cy="852099"/>
-          </a:xfrm>
-          <a:prstGeom prst="roundRect">
-            <a:avLst>
-              <a:gd name="adj" fmla="val 19115"/>
-            </a:avLst>
-          </a:prstGeom>
-          <a:solidFill>
-            <a:srgbClr val="4CD964"/>
-          </a:solidFill>
-          <a:ln>
-            <a:noFill/>
-          </a:ln>
-        </p:spPr>
-        <p:style>
-          <a:lnRef idx="2">
-            <a:schemeClr val="accent6">
-              <a:shade val="50000"/>
-            </a:schemeClr>
-          </a:lnRef>
-          <a:fillRef idx="1">
-            <a:schemeClr val="accent6"/>
-          </a:fillRef>
-          <a:effectRef idx="0">
-            <a:schemeClr val="accent6"/>
-          </a:effectRef>
-          <a:fontRef idx="minor">
-            <a:schemeClr val="lt1"/>
-          </a:fontRef>
-        </p:style>
-        <p:txBody>
-          <a:bodyPr rot="0" spcFirstLastPara="0" vertOverflow="overflow" horzOverflow="overflow" vert="horz" wrap="square" lIns="457119" tIns="228560" rIns="457119" bIns="228560" numCol="1" spcCol="0" rtlCol="0" fromWordArt="0" anchor="ctr" anchorCtr="0" forceAA="0" compatLnSpc="1">
-            <a:prstTxWarp prst="textNoShape">
-              <a:avLst/>
-            </a:prstTxWarp>
-            <a:noAutofit/>
-          </a:bodyPr>
-          <a:lstStyle/>
-          <a:p>
-            <a:pPr algn="ctr"/>
-            <a:endParaRPr lang="de-DE" sz="17000"/>
-          </a:p>
-        </p:txBody>
-      </p:sp>
-      <p:sp>
-        <p:nvSpPr>
-          <p:cNvPr id="34" name="Abgerundetes Rechteck 33"/>
-          <p:cNvSpPr/>
-          <p:nvPr/>
-        </p:nvSpPr>
-        <p:spPr>
-          <a:xfrm>
-            <a:off x="5334596" y="5887231"/>
-            <a:ext cx="852099" cy="852099"/>
-          </a:xfrm>
-          <a:prstGeom prst="roundRect">
-            <a:avLst>
-              <a:gd name="adj" fmla="val 19115"/>
-            </a:avLst>
-          </a:prstGeom>
-          <a:solidFill>
-            <a:srgbClr val="007AFF"/>
-          </a:solidFill>
-          <a:ln>
-            <a:noFill/>
-          </a:ln>
-        </p:spPr>
-        <p:style>
-          <a:lnRef idx="2">
-            <a:schemeClr val="accent6">
-              <a:shade val="50000"/>
-            </a:schemeClr>
-          </a:lnRef>
-          <a:fillRef idx="1">
-            <a:schemeClr val="accent6"/>
-          </a:fillRef>
-          <a:effectRef idx="0">
-            <a:schemeClr val="accent6"/>
-          </a:effectRef>
-          <a:fontRef idx="minor">
-            <a:schemeClr val="lt1"/>
-          </a:fontRef>
-        </p:style>
-        <p:txBody>
-          <a:bodyPr rot="0" spcFirstLastPara="0" vertOverflow="overflow" horzOverflow="overflow" vert="horz" wrap="square" lIns="457119" tIns="228560" rIns="457119" bIns="228560" numCol="1" spcCol="0" rtlCol="0" fromWordArt="0" anchor="ctr" anchorCtr="0" forceAA="0" compatLnSpc="1">
-            <a:prstTxWarp prst="textNoShape">
-              <a:avLst/>
-            </a:prstTxWarp>
-            <a:noAutofit/>
-          </a:bodyPr>
-          <a:lstStyle/>
-          <a:p>
-            <a:pPr algn="ctr"/>
-            <a:endParaRPr lang="de-DE" sz="17000"/>
-          </a:p>
-        </p:txBody>
-      </p:sp>
-      <p:sp>
-        <p:nvSpPr>
-          <p:cNvPr id="35" name="Abgerundetes Rechteck 34"/>
-          <p:cNvSpPr/>
-          <p:nvPr/>
-        </p:nvSpPr>
-        <p:spPr>
-          <a:xfrm>
-            <a:off x="4073721" y="5887231"/>
-            <a:ext cx="852099" cy="852099"/>
-          </a:xfrm>
-          <a:prstGeom prst="roundRect">
-            <a:avLst>
-              <a:gd name="adj" fmla="val 19115"/>
-            </a:avLst>
-          </a:prstGeom>
-          <a:solidFill>
-            <a:srgbClr val="FF9500"/>
-          </a:solidFill>
-          <a:ln>
-            <a:noFill/>
-          </a:ln>
-        </p:spPr>
-        <p:style>
-          <a:lnRef idx="2">
-            <a:schemeClr val="accent6">
-              <a:shade val="50000"/>
-            </a:schemeClr>
-          </a:lnRef>
-          <a:fillRef idx="1">
-            <a:schemeClr val="accent6"/>
-          </a:fillRef>
-          <a:effectRef idx="0">
-            <a:schemeClr val="accent6"/>
-          </a:effectRef>
-          <a:fontRef idx="minor">
-            <a:schemeClr val="lt1"/>
-          </a:fontRef>
-        </p:style>
-        <p:txBody>
-          <a:bodyPr rot="0" spcFirstLastPara="0" vertOverflow="overflow" horzOverflow="overflow" vert="horz" wrap="square" lIns="457119" tIns="228560" rIns="457119" bIns="228560" numCol="1" spcCol="0" rtlCol="0" fromWordArt="0" anchor="ctr" anchorCtr="0" forceAA="0" compatLnSpc="1">
-            <a:prstTxWarp prst="textNoShape">
-              <a:avLst/>
-            </a:prstTxWarp>
-            <a:noAutofit/>
-          </a:bodyPr>
-          <a:lstStyle/>
-          <a:p>
-            <a:pPr algn="ctr"/>
-            <a:endParaRPr lang="de-DE" sz="17000"/>
-          </a:p>
-        </p:txBody>
-      </p:sp>
-      <p:sp>
-        <p:nvSpPr>
           <p:cNvPr id="36" name="Rechteck 35"/>
           <p:cNvSpPr/>
           <p:nvPr/>
@@ -4657,7 +3825,7 @@
     </p:spTree>
     <p:extLst>
       <p:ext uri="{BB962C8B-B14F-4D97-AF65-F5344CB8AC3E}">
-        <p14:creationId xmlns:p14="http://schemas.microsoft.com/office/powerpoint/2010/main" val="87579400"/>
+        <p14:creationId xmlns:p14="http://schemas.microsoft.com/office/powerpoint/2010/main" xmlns="" val="2518892323"/>
       </p:ext>
     </p:extLst>
   </p:cSld>
@@ -5474,6 +4642,863 @@
       </p:grpSp>
       <p:sp>
         <p:nvSpPr>
+          <p:cNvPr id="4" name="Abgerundetes Rechteck 3"/>
+          <p:cNvSpPr/>
+          <p:nvPr/>
+        </p:nvSpPr>
+        <p:spPr>
+          <a:xfrm>
+            <a:off x="2218205" y="640048"/>
+            <a:ext cx="4563130" cy="7719445"/>
+          </a:xfrm>
+          <a:prstGeom prst="roundRect">
+            <a:avLst>
+              <a:gd name="adj" fmla="val 11924"/>
+            </a:avLst>
+          </a:prstGeom>
+          <a:solidFill>
+            <a:schemeClr val="tx1">
+              <a:lumMod val="85000"/>
+              <a:lumOff val="15000"/>
+            </a:schemeClr>
+          </a:solidFill>
+          <a:ln>
+            <a:noFill/>
+          </a:ln>
+        </p:spPr>
+        <p:style>
+          <a:lnRef idx="2">
+            <a:schemeClr val="accent2">
+              <a:shade val="50000"/>
+            </a:schemeClr>
+          </a:lnRef>
+          <a:fillRef idx="1">
+            <a:schemeClr val="accent2"/>
+          </a:fillRef>
+          <a:effectRef idx="0">
+            <a:schemeClr val="accent2"/>
+          </a:effectRef>
+          <a:fontRef idx="minor">
+            <a:schemeClr val="lt1"/>
+          </a:fontRef>
+        </p:style>
+        <p:txBody>
+          <a:bodyPr rot="0" spcFirstLastPara="0" vertOverflow="overflow" horzOverflow="overflow" vert="horz" wrap="square" lIns="457119" tIns="228560" rIns="457119" bIns="228560" numCol="1" spcCol="0" rtlCol="0" fromWordArt="0" anchor="ctr" anchorCtr="0" forceAA="0" compatLnSpc="1">
+            <a:prstTxWarp prst="textNoShape">
+              <a:avLst/>
+            </a:prstTxWarp>
+            <a:noAutofit/>
+          </a:bodyPr>
+          <a:lstStyle/>
+          <a:p>
+            <a:pPr algn="ctr"/>
+            <a:endParaRPr lang="de-DE" sz="17000"/>
+          </a:p>
+        </p:txBody>
+      </p:sp>
+      <p:sp>
+        <p:nvSpPr>
+          <p:cNvPr id="5" name="Abgerundetes Rechteck 4"/>
+          <p:cNvSpPr/>
+          <p:nvPr/>
+        </p:nvSpPr>
+        <p:spPr>
+          <a:xfrm>
+            <a:off x="3903300" y="981479"/>
+            <a:ext cx="1192938" cy="238588"/>
+          </a:xfrm>
+          <a:prstGeom prst="roundRect">
+            <a:avLst>
+              <a:gd name="adj" fmla="val 50000"/>
+            </a:avLst>
+          </a:prstGeom>
+          <a:solidFill>
+            <a:schemeClr val="bg1">
+              <a:lumMod val="95000"/>
+            </a:schemeClr>
+          </a:solidFill>
+          <a:ln>
+            <a:noFill/>
+          </a:ln>
+        </p:spPr>
+        <p:style>
+          <a:lnRef idx="2">
+            <a:schemeClr val="accent4">
+              <a:shade val="50000"/>
+            </a:schemeClr>
+          </a:lnRef>
+          <a:fillRef idx="1">
+            <a:schemeClr val="accent4"/>
+          </a:fillRef>
+          <a:effectRef idx="0">
+            <a:schemeClr val="accent4"/>
+          </a:effectRef>
+          <a:fontRef idx="minor">
+            <a:schemeClr val="lt1"/>
+          </a:fontRef>
+        </p:style>
+        <p:txBody>
+          <a:bodyPr rot="0" spcFirstLastPara="0" vertOverflow="overflow" horzOverflow="overflow" vert="horz" wrap="square" lIns="457119" tIns="228560" rIns="457119" bIns="228560" numCol="1" spcCol="0" rtlCol="0" fromWordArt="0" anchor="ctr" anchorCtr="0" forceAA="0" compatLnSpc="1">
+            <a:prstTxWarp prst="textNoShape">
+              <a:avLst/>
+            </a:prstTxWarp>
+            <a:noAutofit/>
+          </a:bodyPr>
+          <a:lstStyle/>
+          <a:p>
+            <a:pPr algn="ctr"/>
+            <a:endParaRPr lang="de-DE" sz="17000"/>
+          </a:p>
+        </p:txBody>
+      </p:sp>
+      <p:sp>
+        <p:nvSpPr>
+          <p:cNvPr id="11" name="Abgerundetes Rechteck 10"/>
+          <p:cNvSpPr/>
+          <p:nvPr/>
+        </p:nvSpPr>
+        <p:spPr>
+          <a:xfrm>
+            <a:off x="2479728" y="1531224"/>
+            <a:ext cx="4040083" cy="5580021"/>
+          </a:xfrm>
+          <a:prstGeom prst="roundRect">
+            <a:avLst>
+              <a:gd name="adj" fmla="val 1339"/>
+            </a:avLst>
+          </a:prstGeom>
+          <a:solidFill>
+            <a:schemeClr val="bg1">
+              <a:lumMod val="95000"/>
+            </a:schemeClr>
+          </a:solidFill>
+          <a:ln>
+            <a:noFill/>
+          </a:ln>
+        </p:spPr>
+        <p:style>
+          <a:lnRef idx="2">
+            <a:schemeClr val="accent4">
+              <a:shade val="50000"/>
+            </a:schemeClr>
+          </a:lnRef>
+          <a:fillRef idx="1">
+            <a:schemeClr val="accent4"/>
+          </a:fillRef>
+          <a:effectRef idx="0">
+            <a:schemeClr val="accent4"/>
+          </a:effectRef>
+          <a:fontRef idx="minor">
+            <a:schemeClr val="lt1"/>
+          </a:fontRef>
+        </p:style>
+        <p:txBody>
+          <a:bodyPr rot="0" spcFirstLastPara="0" vertOverflow="overflow" horzOverflow="overflow" vert="horz" wrap="square" lIns="457119" tIns="228560" rIns="457119" bIns="228560" numCol="1" spcCol="0" rtlCol="0" fromWordArt="0" anchor="ctr" anchorCtr="0" forceAA="0" compatLnSpc="1">
+            <a:prstTxWarp prst="textNoShape">
+              <a:avLst/>
+            </a:prstTxWarp>
+            <a:noAutofit/>
+          </a:bodyPr>
+          <a:lstStyle/>
+          <a:p>
+            <a:pPr algn="ctr"/>
+            <a:endParaRPr lang="de-DE" sz="17000"/>
+          </a:p>
+        </p:txBody>
+      </p:sp>
+      <p:sp>
+        <p:nvSpPr>
+          <p:cNvPr id="12" name="Abgerundetes Rechteck 11"/>
+          <p:cNvSpPr/>
+          <p:nvPr/>
+        </p:nvSpPr>
+        <p:spPr>
+          <a:xfrm>
+            <a:off x="4158931" y="7381787"/>
+            <a:ext cx="681679" cy="681679"/>
+          </a:xfrm>
+          <a:prstGeom prst="roundRect">
+            <a:avLst>
+              <a:gd name="adj" fmla="val 48488"/>
+            </a:avLst>
+          </a:prstGeom>
+          <a:solidFill>
+            <a:schemeClr val="bg1">
+              <a:lumMod val="95000"/>
+            </a:schemeClr>
+          </a:solidFill>
+          <a:ln>
+            <a:noFill/>
+          </a:ln>
+        </p:spPr>
+        <p:style>
+          <a:lnRef idx="2">
+            <a:schemeClr val="accent4">
+              <a:shade val="50000"/>
+            </a:schemeClr>
+          </a:lnRef>
+          <a:fillRef idx="1">
+            <a:schemeClr val="accent4"/>
+          </a:fillRef>
+          <a:effectRef idx="0">
+            <a:schemeClr val="accent4"/>
+          </a:effectRef>
+          <a:fontRef idx="minor">
+            <a:schemeClr val="lt1"/>
+          </a:fontRef>
+        </p:style>
+        <p:txBody>
+          <a:bodyPr rot="0" spcFirstLastPara="0" vertOverflow="overflow" horzOverflow="overflow" vert="horz" wrap="square" lIns="457119" tIns="228560" rIns="457119" bIns="228560" numCol="1" spcCol="0" rtlCol="0" fromWordArt="0" anchor="ctr" anchorCtr="0" forceAA="0" compatLnSpc="1">
+            <a:prstTxWarp prst="textNoShape">
+              <a:avLst/>
+            </a:prstTxWarp>
+            <a:noAutofit/>
+          </a:bodyPr>
+          <a:lstStyle/>
+          <a:p>
+            <a:pPr algn="ctr"/>
+            <a:endParaRPr lang="de-DE" sz="17000"/>
+          </a:p>
+        </p:txBody>
+      </p:sp>
+      <p:sp>
+        <p:nvSpPr>
+          <p:cNvPr id="16" name="Abgerundetes Rechteck 15"/>
+          <p:cNvSpPr/>
+          <p:nvPr/>
+        </p:nvSpPr>
+        <p:spPr>
+          <a:xfrm>
+            <a:off x="2812846" y="1935553"/>
+            <a:ext cx="852099" cy="852099"/>
+          </a:xfrm>
+          <a:prstGeom prst="roundRect">
+            <a:avLst>
+              <a:gd name="adj" fmla="val 19115"/>
+            </a:avLst>
+          </a:prstGeom>
+          <a:solidFill>
+            <a:srgbClr val="4CD964"/>
+          </a:solidFill>
+          <a:ln>
+            <a:noFill/>
+          </a:ln>
+        </p:spPr>
+        <p:style>
+          <a:lnRef idx="2">
+            <a:schemeClr val="accent6">
+              <a:shade val="50000"/>
+            </a:schemeClr>
+          </a:lnRef>
+          <a:fillRef idx="1">
+            <a:schemeClr val="accent6"/>
+          </a:fillRef>
+          <a:effectRef idx="0">
+            <a:schemeClr val="accent6"/>
+          </a:effectRef>
+          <a:fontRef idx="minor">
+            <a:schemeClr val="lt1"/>
+          </a:fontRef>
+        </p:style>
+        <p:txBody>
+          <a:bodyPr rot="0" spcFirstLastPara="0" vertOverflow="overflow" horzOverflow="overflow" vert="horz" wrap="square" lIns="457119" tIns="228560" rIns="457119" bIns="228560" numCol="1" spcCol="0" rtlCol="0" fromWordArt="0" anchor="ctr" anchorCtr="0" forceAA="0" compatLnSpc="1">
+            <a:prstTxWarp prst="textNoShape">
+              <a:avLst/>
+            </a:prstTxWarp>
+            <a:noAutofit/>
+          </a:bodyPr>
+          <a:lstStyle/>
+          <a:p>
+            <a:pPr algn="ctr"/>
+            <a:endParaRPr lang="de-DE" sz="17000"/>
+          </a:p>
+        </p:txBody>
+      </p:sp>
+      <p:sp>
+        <p:nvSpPr>
+          <p:cNvPr id="17" name="Abgerundetes Rechteck 16"/>
+          <p:cNvSpPr/>
+          <p:nvPr/>
+        </p:nvSpPr>
+        <p:spPr>
+          <a:xfrm>
+            <a:off x="5334596" y="1935553"/>
+            <a:ext cx="852099" cy="852099"/>
+          </a:xfrm>
+          <a:prstGeom prst="roundRect">
+            <a:avLst>
+              <a:gd name="adj" fmla="val 19115"/>
+            </a:avLst>
+          </a:prstGeom>
+          <a:solidFill>
+            <a:srgbClr val="007AFF"/>
+          </a:solidFill>
+          <a:ln>
+            <a:noFill/>
+          </a:ln>
+        </p:spPr>
+        <p:style>
+          <a:lnRef idx="2">
+            <a:schemeClr val="accent6">
+              <a:shade val="50000"/>
+            </a:schemeClr>
+          </a:lnRef>
+          <a:fillRef idx="1">
+            <a:schemeClr val="accent6"/>
+          </a:fillRef>
+          <a:effectRef idx="0">
+            <a:schemeClr val="accent6"/>
+          </a:effectRef>
+          <a:fontRef idx="minor">
+            <a:schemeClr val="lt1"/>
+          </a:fontRef>
+        </p:style>
+        <p:txBody>
+          <a:bodyPr rot="0" spcFirstLastPara="0" vertOverflow="overflow" horzOverflow="overflow" vert="horz" wrap="square" lIns="457119" tIns="228560" rIns="457119" bIns="228560" numCol="1" spcCol="0" rtlCol="0" fromWordArt="0" anchor="ctr" anchorCtr="0" forceAA="0" compatLnSpc="1">
+            <a:prstTxWarp prst="textNoShape">
+              <a:avLst/>
+            </a:prstTxWarp>
+            <a:noAutofit/>
+          </a:bodyPr>
+          <a:lstStyle/>
+          <a:p>
+            <a:pPr algn="ctr"/>
+            <a:endParaRPr lang="de-DE" sz="17000"/>
+          </a:p>
+        </p:txBody>
+      </p:sp>
+      <p:sp>
+        <p:nvSpPr>
+          <p:cNvPr id="19" name="Abgerundetes Rechteck 18"/>
+          <p:cNvSpPr/>
+          <p:nvPr/>
+        </p:nvSpPr>
+        <p:spPr>
+          <a:xfrm>
+            <a:off x="4073721" y="1935553"/>
+            <a:ext cx="852099" cy="852099"/>
+          </a:xfrm>
+          <a:prstGeom prst="roundRect">
+            <a:avLst>
+              <a:gd name="adj" fmla="val 19115"/>
+            </a:avLst>
+          </a:prstGeom>
+          <a:solidFill>
+            <a:srgbClr val="FF2D55"/>
+          </a:solidFill>
+          <a:ln>
+            <a:noFill/>
+          </a:ln>
+        </p:spPr>
+        <p:style>
+          <a:lnRef idx="2">
+            <a:schemeClr val="accent6">
+              <a:shade val="50000"/>
+            </a:schemeClr>
+          </a:lnRef>
+          <a:fillRef idx="1">
+            <a:schemeClr val="accent6"/>
+          </a:fillRef>
+          <a:effectRef idx="0">
+            <a:schemeClr val="accent6"/>
+          </a:effectRef>
+          <a:fontRef idx="minor">
+            <a:schemeClr val="lt1"/>
+          </a:fontRef>
+        </p:style>
+        <p:txBody>
+          <a:bodyPr rot="0" spcFirstLastPara="0" vertOverflow="overflow" horzOverflow="overflow" vert="horz" wrap="square" lIns="457119" tIns="228560" rIns="457119" bIns="228560" numCol="1" spcCol="0" rtlCol="0" fromWordArt="0" anchor="ctr" anchorCtr="0" forceAA="0" compatLnSpc="1">
+            <a:prstTxWarp prst="textNoShape">
+              <a:avLst/>
+            </a:prstTxWarp>
+            <a:noAutofit/>
+          </a:bodyPr>
+          <a:lstStyle/>
+          <a:p>
+            <a:pPr algn="ctr"/>
+            <a:endParaRPr lang="de-DE" sz="17000"/>
+          </a:p>
+        </p:txBody>
+      </p:sp>
+      <p:sp>
+        <p:nvSpPr>
+          <p:cNvPr id="25" name="Abgerundetes Rechteck 24"/>
+          <p:cNvSpPr/>
+          <p:nvPr/>
+        </p:nvSpPr>
+        <p:spPr>
+          <a:xfrm>
+            <a:off x="2812846" y="3252778"/>
+            <a:ext cx="852099" cy="852099"/>
+          </a:xfrm>
+          <a:prstGeom prst="roundRect">
+            <a:avLst>
+              <a:gd name="adj" fmla="val 19115"/>
+            </a:avLst>
+          </a:prstGeom>
+          <a:solidFill>
+            <a:srgbClr val="FF9500"/>
+          </a:solidFill>
+          <a:ln>
+            <a:noFill/>
+          </a:ln>
+        </p:spPr>
+        <p:style>
+          <a:lnRef idx="2">
+            <a:schemeClr val="accent6">
+              <a:shade val="50000"/>
+            </a:schemeClr>
+          </a:lnRef>
+          <a:fillRef idx="1">
+            <a:schemeClr val="accent6"/>
+          </a:fillRef>
+          <a:effectRef idx="0">
+            <a:schemeClr val="accent6"/>
+          </a:effectRef>
+          <a:fontRef idx="minor">
+            <a:schemeClr val="lt1"/>
+          </a:fontRef>
+        </p:style>
+        <p:txBody>
+          <a:bodyPr rot="0" spcFirstLastPara="0" vertOverflow="overflow" horzOverflow="overflow" vert="horz" wrap="square" lIns="457119" tIns="228560" rIns="457119" bIns="228560" numCol="1" spcCol="0" rtlCol="0" fromWordArt="0" anchor="ctr" anchorCtr="0" forceAA="0" compatLnSpc="1">
+            <a:prstTxWarp prst="textNoShape">
+              <a:avLst/>
+            </a:prstTxWarp>
+            <a:noAutofit/>
+          </a:bodyPr>
+          <a:lstStyle/>
+          <a:p>
+            <a:pPr algn="ctr"/>
+            <a:endParaRPr lang="de-DE" sz="17000"/>
+          </a:p>
+        </p:txBody>
+      </p:sp>
+      <p:sp>
+        <p:nvSpPr>
+          <p:cNvPr id="26" name="Abgerundetes Rechteck 25"/>
+          <p:cNvSpPr/>
+          <p:nvPr/>
+        </p:nvSpPr>
+        <p:spPr>
+          <a:xfrm>
+            <a:off x="5334596" y="3252778"/>
+            <a:ext cx="852099" cy="852099"/>
+          </a:xfrm>
+          <a:prstGeom prst="roundRect">
+            <a:avLst>
+              <a:gd name="adj" fmla="val 19115"/>
+            </a:avLst>
+          </a:prstGeom>
+          <a:solidFill>
+            <a:srgbClr val="FF2D55"/>
+          </a:solidFill>
+          <a:ln>
+            <a:noFill/>
+          </a:ln>
+        </p:spPr>
+        <p:style>
+          <a:lnRef idx="2">
+            <a:schemeClr val="accent6">
+              <a:shade val="50000"/>
+            </a:schemeClr>
+          </a:lnRef>
+          <a:fillRef idx="1">
+            <a:schemeClr val="accent6"/>
+          </a:fillRef>
+          <a:effectRef idx="0">
+            <a:schemeClr val="accent6"/>
+          </a:effectRef>
+          <a:fontRef idx="minor">
+            <a:schemeClr val="lt1"/>
+          </a:fontRef>
+        </p:style>
+        <p:txBody>
+          <a:bodyPr rot="0" spcFirstLastPara="0" vertOverflow="overflow" horzOverflow="overflow" vert="horz" wrap="square" lIns="457119" tIns="228560" rIns="457119" bIns="228560" numCol="1" spcCol="0" rtlCol="0" fromWordArt="0" anchor="ctr" anchorCtr="0" forceAA="0" compatLnSpc="1">
+            <a:prstTxWarp prst="textNoShape">
+              <a:avLst/>
+            </a:prstTxWarp>
+            <a:noAutofit/>
+          </a:bodyPr>
+          <a:lstStyle/>
+          <a:p>
+            <a:pPr algn="ctr"/>
+            <a:endParaRPr lang="de-DE" sz="17000"/>
+          </a:p>
+        </p:txBody>
+      </p:sp>
+      <p:sp>
+        <p:nvSpPr>
+          <p:cNvPr id="27" name="Abgerundetes Rechteck 26"/>
+          <p:cNvSpPr/>
+          <p:nvPr/>
+        </p:nvSpPr>
+        <p:spPr>
+          <a:xfrm>
+            <a:off x="4073721" y="3252778"/>
+            <a:ext cx="852099" cy="852099"/>
+          </a:xfrm>
+          <a:prstGeom prst="roundRect">
+            <a:avLst>
+              <a:gd name="adj" fmla="val 19115"/>
+            </a:avLst>
+          </a:prstGeom>
+          <a:solidFill>
+            <a:srgbClr val="007AFF"/>
+          </a:solidFill>
+          <a:ln>
+            <a:noFill/>
+          </a:ln>
+        </p:spPr>
+        <p:style>
+          <a:lnRef idx="2">
+            <a:schemeClr val="accent6">
+              <a:shade val="50000"/>
+            </a:schemeClr>
+          </a:lnRef>
+          <a:fillRef idx="1">
+            <a:schemeClr val="accent6"/>
+          </a:fillRef>
+          <a:effectRef idx="0">
+            <a:schemeClr val="accent6"/>
+          </a:effectRef>
+          <a:fontRef idx="minor">
+            <a:schemeClr val="lt1"/>
+          </a:fontRef>
+        </p:style>
+        <p:txBody>
+          <a:bodyPr rot="0" spcFirstLastPara="0" vertOverflow="overflow" horzOverflow="overflow" vert="horz" wrap="square" lIns="457119" tIns="228560" rIns="457119" bIns="228560" numCol="1" spcCol="0" rtlCol="0" fromWordArt="0" anchor="ctr" anchorCtr="0" forceAA="0" compatLnSpc="1">
+            <a:prstTxWarp prst="textNoShape">
+              <a:avLst/>
+            </a:prstTxWarp>
+            <a:noAutofit/>
+          </a:bodyPr>
+          <a:lstStyle/>
+          <a:p>
+            <a:pPr algn="ctr"/>
+            <a:endParaRPr lang="de-DE" sz="17000"/>
+          </a:p>
+        </p:txBody>
+      </p:sp>
+      <p:sp>
+        <p:nvSpPr>
+          <p:cNvPr id="29" name="Abgerundetes Rechteck 28"/>
+          <p:cNvSpPr/>
+          <p:nvPr/>
+        </p:nvSpPr>
+        <p:spPr>
+          <a:xfrm>
+            <a:off x="2812846" y="4570004"/>
+            <a:ext cx="852099" cy="852099"/>
+          </a:xfrm>
+          <a:prstGeom prst="roundRect">
+            <a:avLst>
+              <a:gd name="adj" fmla="val 19115"/>
+            </a:avLst>
+          </a:prstGeom>
+          <a:solidFill>
+            <a:srgbClr val="FF2D55"/>
+          </a:solidFill>
+          <a:ln>
+            <a:noFill/>
+          </a:ln>
+        </p:spPr>
+        <p:style>
+          <a:lnRef idx="2">
+            <a:schemeClr val="accent6">
+              <a:shade val="50000"/>
+            </a:schemeClr>
+          </a:lnRef>
+          <a:fillRef idx="1">
+            <a:schemeClr val="accent6"/>
+          </a:fillRef>
+          <a:effectRef idx="0">
+            <a:schemeClr val="accent6"/>
+          </a:effectRef>
+          <a:fontRef idx="minor">
+            <a:schemeClr val="lt1"/>
+          </a:fontRef>
+        </p:style>
+        <p:txBody>
+          <a:bodyPr rot="0" spcFirstLastPara="0" vertOverflow="overflow" horzOverflow="overflow" vert="horz" wrap="square" lIns="457119" tIns="228560" rIns="457119" bIns="228560" numCol="1" spcCol="0" rtlCol="0" fromWordArt="0" anchor="ctr" anchorCtr="0" forceAA="0" compatLnSpc="1">
+            <a:prstTxWarp prst="textNoShape">
+              <a:avLst/>
+            </a:prstTxWarp>
+            <a:noAutofit/>
+          </a:bodyPr>
+          <a:lstStyle/>
+          <a:p>
+            <a:pPr algn="ctr"/>
+            <a:endParaRPr lang="de-DE" sz="17000"/>
+          </a:p>
+        </p:txBody>
+      </p:sp>
+      <p:sp>
+        <p:nvSpPr>
+          <p:cNvPr id="30" name="Abgerundetes Rechteck 29"/>
+          <p:cNvSpPr/>
+          <p:nvPr/>
+        </p:nvSpPr>
+        <p:spPr>
+          <a:xfrm>
+            <a:off x="5334596" y="4570004"/>
+            <a:ext cx="852099" cy="852099"/>
+          </a:xfrm>
+          <a:prstGeom prst="roundRect">
+            <a:avLst>
+              <a:gd name="adj" fmla="val 19115"/>
+            </a:avLst>
+          </a:prstGeom>
+          <a:solidFill>
+            <a:srgbClr val="FF9500"/>
+          </a:solidFill>
+          <a:ln>
+            <a:noFill/>
+          </a:ln>
+        </p:spPr>
+        <p:style>
+          <a:lnRef idx="2">
+            <a:schemeClr val="accent6">
+              <a:shade val="50000"/>
+            </a:schemeClr>
+          </a:lnRef>
+          <a:fillRef idx="1">
+            <a:schemeClr val="accent6"/>
+          </a:fillRef>
+          <a:effectRef idx="0">
+            <a:schemeClr val="accent6"/>
+          </a:effectRef>
+          <a:fontRef idx="minor">
+            <a:schemeClr val="lt1"/>
+          </a:fontRef>
+        </p:style>
+        <p:txBody>
+          <a:bodyPr rot="0" spcFirstLastPara="0" vertOverflow="overflow" horzOverflow="overflow" vert="horz" wrap="square" lIns="457119" tIns="228560" rIns="457119" bIns="228560" numCol="1" spcCol="0" rtlCol="0" fromWordArt="0" anchor="ctr" anchorCtr="0" forceAA="0" compatLnSpc="1">
+            <a:prstTxWarp prst="textNoShape">
+              <a:avLst/>
+            </a:prstTxWarp>
+            <a:noAutofit/>
+          </a:bodyPr>
+          <a:lstStyle/>
+          <a:p>
+            <a:pPr algn="ctr"/>
+            <a:endParaRPr lang="de-DE" sz="17000"/>
+          </a:p>
+        </p:txBody>
+      </p:sp>
+      <p:sp>
+        <p:nvSpPr>
+          <p:cNvPr id="31" name="Abgerundetes Rechteck 30"/>
+          <p:cNvSpPr/>
+          <p:nvPr/>
+        </p:nvSpPr>
+        <p:spPr>
+          <a:xfrm>
+            <a:off x="4073721" y="4570004"/>
+            <a:ext cx="852099" cy="852099"/>
+          </a:xfrm>
+          <a:prstGeom prst="roundRect">
+            <a:avLst>
+              <a:gd name="adj" fmla="val 19115"/>
+            </a:avLst>
+          </a:prstGeom>
+          <a:solidFill>
+            <a:srgbClr val="4CD964"/>
+          </a:solidFill>
+          <a:ln>
+            <a:noFill/>
+          </a:ln>
+        </p:spPr>
+        <p:style>
+          <a:lnRef idx="2">
+            <a:schemeClr val="accent6">
+              <a:shade val="50000"/>
+            </a:schemeClr>
+          </a:lnRef>
+          <a:fillRef idx="1">
+            <a:schemeClr val="accent6"/>
+          </a:fillRef>
+          <a:effectRef idx="0">
+            <a:schemeClr val="accent6"/>
+          </a:effectRef>
+          <a:fontRef idx="minor">
+            <a:schemeClr val="lt1"/>
+          </a:fontRef>
+        </p:style>
+        <p:txBody>
+          <a:bodyPr rot="0" spcFirstLastPara="0" vertOverflow="overflow" horzOverflow="overflow" vert="horz" wrap="square" lIns="457119" tIns="228560" rIns="457119" bIns="228560" numCol="1" spcCol="0" rtlCol="0" fromWordArt="0" anchor="ctr" anchorCtr="0" forceAA="0" compatLnSpc="1">
+            <a:prstTxWarp prst="textNoShape">
+              <a:avLst/>
+            </a:prstTxWarp>
+            <a:noAutofit/>
+          </a:bodyPr>
+          <a:lstStyle/>
+          <a:p>
+            <a:pPr algn="ctr"/>
+            <a:endParaRPr lang="de-DE" sz="17000"/>
+          </a:p>
+        </p:txBody>
+      </p:sp>
+      <p:sp>
+        <p:nvSpPr>
+          <p:cNvPr id="33" name="Abgerundetes Rechteck 32"/>
+          <p:cNvSpPr/>
+          <p:nvPr/>
+        </p:nvSpPr>
+        <p:spPr>
+          <a:xfrm>
+            <a:off x="2812846" y="5887231"/>
+            <a:ext cx="852099" cy="852099"/>
+          </a:xfrm>
+          <a:prstGeom prst="roundRect">
+            <a:avLst>
+              <a:gd name="adj" fmla="val 19115"/>
+            </a:avLst>
+          </a:prstGeom>
+          <a:solidFill>
+            <a:srgbClr val="4CD964"/>
+          </a:solidFill>
+          <a:ln>
+            <a:noFill/>
+          </a:ln>
+        </p:spPr>
+        <p:style>
+          <a:lnRef idx="2">
+            <a:schemeClr val="accent6">
+              <a:shade val="50000"/>
+            </a:schemeClr>
+          </a:lnRef>
+          <a:fillRef idx="1">
+            <a:schemeClr val="accent6"/>
+          </a:fillRef>
+          <a:effectRef idx="0">
+            <a:schemeClr val="accent6"/>
+          </a:effectRef>
+          <a:fontRef idx="minor">
+            <a:schemeClr val="lt1"/>
+          </a:fontRef>
+        </p:style>
+        <p:txBody>
+          <a:bodyPr rot="0" spcFirstLastPara="0" vertOverflow="overflow" horzOverflow="overflow" vert="horz" wrap="square" lIns="457119" tIns="228560" rIns="457119" bIns="228560" numCol="1" spcCol="0" rtlCol="0" fromWordArt="0" anchor="ctr" anchorCtr="0" forceAA="0" compatLnSpc="1">
+            <a:prstTxWarp prst="textNoShape">
+              <a:avLst/>
+            </a:prstTxWarp>
+            <a:noAutofit/>
+          </a:bodyPr>
+          <a:lstStyle/>
+          <a:p>
+            <a:pPr algn="ctr"/>
+            <a:endParaRPr lang="de-DE" sz="17000"/>
+          </a:p>
+        </p:txBody>
+      </p:sp>
+      <p:sp>
+        <p:nvSpPr>
+          <p:cNvPr id="34" name="Abgerundetes Rechteck 33"/>
+          <p:cNvSpPr/>
+          <p:nvPr/>
+        </p:nvSpPr>
+        <p:spPr>
+          <a:xfrm>
+            <a:off x="5334596" y="5887231"/>
+            <a:ext cx="852099" cy="852099"/>
+          </a:xfrm>
+          <a:prstGeom prst="roundRect">
+            <a:avLst>
+              <a:gd name="adj" fmla="val 19115"/>
+            </a:avLst>
+          </a:prstGeom>
+          <a:solidFill>
+            <a:srgbClr val="007AFF"/>
+          </a:solidFill>
+          <a:ln>
+            <a:noFill/>
+          </a:ln>
+        </p:spPr>
+        <p:style>
+          <a:lnRef idx="2">
+            <a:schemeClr val="accent6">
+              <a:shade val="50000"/>
+            </a:schemeClr>
+          </a:lnRef>
+          <a:fillRef idx="1">
+            <a:schemeClr val="accent6"/>
+          </a:fillRef>
+          <a:effectRef idx="0">
+            <a:schemeClr val="accent6"/>
+          </a:effectRef>
+          <a:fontRef idx="minor">
+            <a:schemeClr val="lt1"/>
+          </a:fontRef>
+        </p:style>
+        <p:txBody>
+          <a:bodyPr rot="0" spcFirstLastPara="0" vertOverflow="overflow" horzOverflow="overflow" vert="horz" wrap="square" lIns="457119" tIns="228560" rIns="457119" bIns="228560" numCol="1" spcCol="0" rtlCol="0" fromWordArt="0" anchor="ctr" anchorCtr="0" forceAA="0" compatLnSpc="1">
+            <a:prstTxWarp prst="textNoShape">
+              <a:avLst/>
+            </a:prstTxWarp>
+            <a:noAutofit/>
+          </a:bodyPr>
+          <a:lstStyle/>
+          <a:p>
+            <a:pPr algn="ctr"/>
+            <a:endParaRPr lang="de-DE" sz="17000"/>
+          </a:p>
+        </p:txBody>
+      </p:sp>
+      <p:sp>
+        <p:nvSpPr>
+          <p:cNvPr id="35" name="Abgerundetes Rechteck 34"/>
+          <p:cNvSpPr/>
+          <p:nvPr/>
+        </p:nvSpPr>
+        <p:spPr>
+          <a:xfrm>
+            <a:off x="4073721" y="5887231"/>
+            <a:ext cx="852099" cy="852099"/>
+          </a:xfrm>
+          <a:prstGeom prst="roundRect">
+            <a:avLst>
+              <a:gd name="adj" fmla="val 19115"/>
+            </a:avLst>
+          </a:prstGeom>
+          <a:solidFill>
+            <a:srgbClr val="FF9500"/>
+          </a:solidFill>
+          <a:ln>
+            <a:noFill/>
+          </a:ln>
+        </p:spPr>
+        <p:style>
+          <a:lnRef idx="2">
+            <a:schemeClr val="accent6">
+              <a:shade val="50000"/>
+            </a:schemeClr>
+          </a:lnRef>
+          <a:fillRef idx="1">
+            <a:schemeClr val="accent6"/>
+          </a:fillRef>
+          <a:effectRef idx="0">
+            <a:schemeClr val="accent6"/>
+          </a:effectRef>
+          <a:fontRef idx="minor">
+            <a:schemeClr val="lt1"/>
+          </a:fontRef>
+        </p:style>
+        <p:txBody>
+          <a:bodyPr rot="0" spcFirstLastPara="0" vertOverflow="overflow" horzOverflow="overflow" vert="horz" wrap="square" lIns="457119" tIns="228560" rIns="457119" bIns="228560" numCol="1" spcCol="0" rtlCol="0" fromWordArt="0" anchor="ctr" anchorCtr="0" forceAA="0" compatLnSpc="1">
+            <a:prstTxWarp prst="textNoShape">
+              <a:avLst/>
+            </a:prstTxWarp>
+            <a:noAutofit/>
+          </a:bodyPr>
+          <a:lstStyle/>
+          <a:p>
+            <a:pPr algn="ctr"/>
+            <a:endParaRPr lang="de-DE" sz="17000"/>
+          </a:p>
+        </p:txBody>
+      </p:sp>
+      <p:sp>
+        <p:nvSpPr>
           <p:cNvPr id="36" name="Rechteck 35"/>
           <p:cNvSpPr/>
           <p:nvPr/>
@@ -5519,7 +5544,1096 @@
     </p:spTree>
     <p:extLst>
       <p:ext uri="{BB962C8B-B14F-4D97-AF65-F5344CB8AC3E}">
-        <p14:creationId xmlns:p14="http://schemas.microsoft.com/office/powerpoint/2010/main" val="2518892323"/>
+        <p14:creationId xmlns:p14="http://schemas.microsoft.com/office/powerpoint/2010/main" xmlns="" val="87579400"/>
+      </p:ext>
+    </p:extLst>
+  </p:cSld>
+  <p:clrMapOvr>
+    <a:masterClrMapping/>
+  </p:clrMapOvr>
+  <p:timing>
+    <p:tnLst>
+      <p:par>
+        <p:cTn id="1" dur="indefinite" restart="never" nodeType="tmRoot"/>
+      </p:par>
+    </p:tnLst>
+  </p:timing>
+</p:sld>
+</file>
+
+<file path=ppt/slides/slide3.xml><?xml version="1.0" encoding="utf-8"?>
+<p:sld xmlns:a="http://schemas.openxmlformats.org/drawingml/2006/main" xmlns:r="http://schemas.openxmlformats.org/officeDocument/2006/relationships" xmlns:p="http://schemas.openxmlformats.org/presentationml/2006/main">
+  <p:cSld>
+    <p:spTree>
+      <p:nvGrpSpPr>
+        <p:cNvPr id="1" name=""/>
+        <p:cNvGrpSpPr/>
+        <p:nvPr/>
+      </p:nvGrpSpPr>
+      <p:grpSpPr>
+        <a:xfrm>
+          <a:off x="0" y="0"/>
+          <a:ext cx="0" cy="0"/>
+          <a:chOff x="0" y="0"/>
+          <a:chExt cx="0" cy="0"/>
+        </a:xfrm>
+      </p:grpSpPr>
+      <p:grpSp>
+        <p:nvGrpSpPr>
+          <p:cNvPr id="20" name="Gruppieren 19"/>
+          <p:cNvGrpSpPr/>
+          <p:nvPr/>
+        </p:nvGrpSpPr>
+        <p:grpSpPr>
+          <a:xfrm>
+            <a:off x="0" y="-1590"/>
+            <a:ext cx="8999538" cy="9001128"/>
+            <a:chOff x="0" y="-1590"/>
+            <a:chExt cx="8999538" cy="9001128"/>
+          </a:xfrm>
+        </p:grpSpPr>
+        <p:sp>
+          <p:nvSpPr>
+            <p:cNvPr id="21" name="Abgerundetes Rechteck 20"/>
+            <p:cNvSpPr/>
+            <p:nvPr/>
+          </p:nvSpPr>
+          <p:spPr>
+            <a:xfrm>
+              <a:off x="0" y="3181"/>
+              <a:ext cx="8999538" cy="8996357"/>
+            </a:xfrm>
+            <a:prstGeom prst="roundRect">
+              <a:avLst>
+                <a:gd name="adj" fmla="val 20959"/>
+              </a:avLst>
+            </a:prstGeom>
+            <a:solidFill>
+              <a:schemeClr val="accent1">
+                <a:lumMod val="20000"/>
+                <a:lumOff val="80000"/>
+              </a:schemeClr>
+            </a:solidFill>
+            <a:ln>
+              <a:noFill/>
+            </a:ln>
+          </p:spPr>
+          <p:style>
+            <a:lnRef idx="2">
+              <a:schemeClr val="accent2">
+                <a:shade val="50000"/>
+              </a:schemeClr>
+            </a:lnRef>
+            <a:fillRef idx="1">
+              <a:schemeClr val="accent2"/>
+            </a:fillRef>
+            <a:effectRef idx="0">
+              <a:schemeClr val="accent2"/>
+            </a:effectRef>
+            <a:fontRef idx="minor">
+              <a:schemeClr val="lt1"/>
+            </a:fontRef>
+          </p:style>
+          <p:txBody>
+            <a:bodyPr rot="0" spcFirstLastPara="0" vertOverflow="overflow" horzOverflow="overflow" vert="horz" wrap="square" lIns="457119" tIns="228560" rIns="457119" bIns="228560" numCol="1" spcCol="0" rtlCol="0" fromWordArt="0" anchor="ctr" anchorCtr="0" forceAA="0" compatLnSpc="1">
+              <a:prstTxWarp prst="textNoShape">
+                <a:avLst/>
+              </a:prstTxWarp>
+              <a:noAutofit/>
+            </a:bodyPr>
+            <a:lstStyle/>
+            <a:p>
+              <a:pPr algn="ctr"/>
+              <a:endParaRPr lang="de-DE" sz="17000"/>
+            </a:p>
+          </p:txBody>
+        </p:sp>
+        <p:sp>
+          <p:nvSpPr>
+            <p:cNvPr id="22" name="Abgerundetes Rechteck 21"/>
+            <p:cNvSpPr/>
+            <p:nvPr/>
+          </p:nvSpPr>
+          <p:spPr>
+            <a:xfrm>
+              <a:off x="588169" y="580719"/>
+              <a:ext cx="7823200" cy="7838100"/>
+            </a:xfrm>
+            <a:prstGeom prst="roundRect">
+              <a:avLst>
+                <a:gd name="adj" fmla="val 656"/>
+              </a:avLst>
+            </a:prstGeom>
+            <a:solidFill>
+              <a:schemeClr val="accent1">
+                <a:lumMod val="20000"/>
+                <a:lumOff val="80000"/>
+              </a:schemeClr>
+            </a:solidFill>
+            <a:ln w="38100">
+              <a:solidFill>
+                <a:schemeClr val="bg1"/>
+              </a:solidFill>
+            </a:ln>
+          </p:spPr>
+          <p:style>
+            <a:lnRef idx="2">
+              <a:schemeClr val="accent2">
+                <a:shade val="50000"/>
+              </a:schemeClr>
+            </a:lnRef>
+            <a:fillRef idx="1">
+              <a:schemeClr val="accent2"/>
+            </a:fillRef>
+            <a:effectRef idx="0">
+              <a:schemeClr val="accent2"/>
+            </a:effectRef>
+            <a:fontRef idx="minor">
+              <a:schemeClr val="lt1"/>
+            </a:fontRef>
+          </p:style>
+          <p:txBody>
+            <a:bodyPr rot="0" spcFirstLastPara="0" vertOverflow="overflow" horzOverflow="overflow" vert="horz" wrap="square" lIns="457119" tIns="228560" rIns="457119" bIns="228560" numCol="1" spcCol="0" rtlCol="0" fromWordArt="0" anchor="ctr" anchorCtr="0" forceAA="0" compatLnSpc="1">
+              <a:prstTxWarp prst="textNoShape">
+                <a:avLst/>
+              </a:prstTxWarp>
+              <a:noAutofit/>
+            </a:bodyPr>
+            <a:lstStyle/>
+            <a:p>
+              <a:pPr algn="ctr"/>
+              <a:endParaRPr lang="de-DE" sz="17000"/>
+            </a:p>
+          </p:txBody>
+        </p:sp>
+        <p:sp>
+          <p:nvSpPr>
+            <p:cNvPr id="23" name="Abgerundetes Rechteck 22"/>
+            <p:cNvSpPr/>
+            <p:nvPr/>
+          </p:nvSpPr>
+          <p:spPr>
+            <a:xfrm>
+              <a:off x="588169" y="580719"/>
+              <a:ext cx="7823200" cy="7838100"/>
+            </a:xfrm>
+            <a:prstGeom prst="roundRect">
+              <a:avLst>
+                <a:gd name="adj" fmla="val 50000"/>
+              </a:avLst>
+            </a:prstGeom>
+            <a:solidFill>
+              <a:schemeClr val="accent1">
+                <a:lumMod val="20000"/>
+                <a:lumOff val="80000"/>
+              </a:schemeClr>
+            </a:solidFill>
+            <a:ln w="38100">
+              <a:solidFill>
+                <a:schemeClr val="bg1"/>
+              </a:solidFill>
+            </a:ln>
+          </p:spPr>
+          <p:style>
+            <a:lnRef idx="2">
+              <a:schemeClr val="accent2">
+                <a:shade val="50000"/>
+              </a:schemeClr>
+            </a:lnRef>
+            <a:fillRef idx="1">
+              <a:schemeClr val="accent2"/>
+            </a:fillRef>
+            <a:effectRef idx="0">
+              <a:schemeClr val="accent2"/>
+            </a:effectRef>
+            <a:fontRef idx="minor">
+              <a:schemeClr val="lt1"/>
+            </a:fontRef>
+          </p:style>
+          <p:txBody>
+            <a:bodyPr rot="0" spcFirstLastPara="0" vertOverflow="overflow" horzOverflow="overflow" vert="horz" wrap="square" lIns="457119" tIns="228560" rIns="457119" bIns="228560" numCol="1" spcCol="0" rtlCol="0" fromWordArt="0" anchor="ctr" anchorCtr="0" forceAA="0" compatLnSpc="1">
+              <a:prstTxWarp prst="textNoShape">
+                <a:avLst/>
+              </a:prstTxWarp>
+              <a:noAutofit/>
+            </a:bodyPr>
+            <a:lstStyle/>
+            <a:p>
+              <a:pPr algn="ctr"/>
+              <a:endParaRPr lang="de-DE" sz="17000"/>
+            </a:p>
+          </p:txBody>
+        </p:sp>
+        <p:sp>
+          <p:nvSpPr>
+            <p:cNvPr id="24" name="Abgerundetes Rechteck 23"/>
+            <p:cNvSpPr/>
+            <p:nvPr/>
+          </p:nvSpPr>
+          <p:spPr>
+            <a:xfrm>
+              <a:off x="2159769" y="2159769"/>
+              <a:ext cx="4680000" cy="4680000"/>
+            </a:xfrm>
+            <a:prstGeom prst="roundRect">
+              <a:avLst>
+                <a:gd name="adj" fmla="val 50000"/>
+              </a:avLst>
+            </a:prstGeom>
+            <a:solidFill>
+              <a:schemeClr val="accent1">
+                <a:lumMod val="20000"/>
+                <a:lumOff val="80000"/>
+              </a:schemeClr>
+            </a:solidFill>
+            <a:ln w="38100">
+              <a:solidFill>
+                <a:schemeClr val="bg1"/>
+              </a:solidFill>
+            </a:ln>
+          </p:spPr>
+          <p:style>
+            <a:lnRef idx="2">
+              <a:schemeClr val="accent2">
+                <a:shade val="50000"/>
+              </a:schemeClr>
+            </a:lnRef>
+            <a:fillRef idx="1">
+              <a:schemeClr val="accent2"/>
+            </a:fillRef>
+            <a:effectRef idx="0">
+              <a:schemeClr val="accent2"/>
+            </a:effectRef>
+            <a:fontRef idx="minor">
+              <a:schemeClr val="lt1"/>
+            </a:fontRef>
+          </p:style>
+          <p:txBody>
+            <a:bodyPr rot="0" spcFirstLastPara="0" vertOverflow="overflow" horzOverflow="overflow" vert="horz" wrap="square" lIns="457119" tIns="228560" rIns="457119" bIns="228560" numCol="1" spcCol="0" rtlCol="0" fromWordArt="0" anchor="ctr" anchorCtr="0" forceAA="0" compatLnSpc="1">
+              <a:prstTxWarp prst="textNoShape">
+                <a:avLst/>
+              </a:prstTxWarp>
+              <a:noAutofit/>
+            </a:bodyPr>
+            <a:lstStyle/>
+            <a:p>
+              <a:pPr algn="ctr"/>
+              <a:endParaRPr lang="de-DE" sz="17000"/>
+            </a:p>
+          </p:txBody>
+        </p:sp>
+        <p:sp>
+          <p:nvSpPr>
+            <p:cNvPr id="28" name="Abgerundetes Rechteck 27"/>
+            <p:cNvSpPr/>
+            <p:nvPr/>
+          </p:nvSpPr>
+          <p:spPr>
+            <a:xfrm>
+              <a:off x="2159769" y="2159769"/>
+              <a:ext cx="4680000" cy="4680000"/>
+            </a:xfrm>
+            <a:prstGeom prst="roundRect">
+              <a:avLst>
+                <a:gd name="adj" fmla="val 0"/>
+              </a:avLst>
+            </a:prstGeom>
+            <a:solidFill>
+              <a:schemeClr val="accent1">
+                <a:lumMod val="20000"/>
+                <a:lumOff val="80000"/>
+              </a:schemeClr>
+            </a:solidFill>
+            <a:ln w="38100">
+              <a:solidFill>
+                <a:schemeClr val="bg1"/>
+              </a:solidFill>
+            </a:ln>
+          </p:spPr>
+          <p:style>
+            <a:lnRef idx="2">
+              <a:schemeClr val="accent2">
+                <a:shade val="50000"/>
+              </a:schemeClr>
+            </a:lnRef>
+            <a:fillRef idx="1">
+              <a:schemeClr val="accent2"/>
+            </a:fillRef>
+            <a:effectRef idx="0">
+              <a:schemeClr val="accent2"/>
+            </a:effectRef>
+            <a:fontRef idx="minor">
+              <a:schemeClr val="lt1"/>
+            </a:fontRef>
+          </p:style>
+          <p:txBody>
+            <a:bodyPr rot="0" spcFirstLastPara="0" vertOverflow="overflow" horzOverflow="overflow" vert="horz" wrap="square" lIns="457119" tIns="228560" rIns="457119" bIns="228560" numCol="1" spcCol="0" rtlCol="0" fromWordArt="0" anchor="ctr" anchorCtr="0" forceAA="0" compatLnSpc="1">
+              <a:prstTxWarp prst="textNoShape">
+                <a:avLst/>
+              </a:prstTxWarp>
+              <a:noAutofit/>
+            </a:bodyPr>
+            <a:lstStyle/>
+            <a:p>
+              <a:pPr algn="ctr"/>
+              <a:endParaRPr lang="de-DE" sz="17000"/>
+            </a:p>
+          </p:txBody>
+        </p:sp>
+        <p:sp>
+          <p:nvSpPr>
+            <p:cNvPr id="32" name="Abgerundetes Rechteck 31"/>
+            <p:cNvSpPr/>
+            <p:nvPr/>
+          </p:nvSpPr>
+          <p:spPr>
+            <a:xfrm>
+              <a:off x="2879769" y="2878179"/>
+              <a:ext cx="3240000" cy="3240000"/>
+            </a:xfrm>
+            <a:prstGeom prst="roundRect">
+              <a:avLst>
+                <a:gd name="adj" fmla="val 50000"/>
+              </a:avLst>
+            </a:prstGeom>
+            <a:solidFill>
+              <a:schemeClr val="accent1">
+                <a:lumMod val="20000"/>
+                <a:lumOff val="80000"/>
+              </a:schemeClr>
+            </a:solidFill>
+            <a:ln w="38100">
+              <a:solidFill>
+                <a:schemeClr val="bg1"/>
+              </a:solidFill>
+            </a:ln>
+          </p:spPr>
+          <p:style>
+            <a:lnRef idx="2">
+              <a:schemeClr val="accent2">
+                <a:shade val="50000"/>
+              </a:schemeClr>
+            </a:lnRef>
+            <a:fillRef idx="1">
+              <a:schemeClr val="accent2"/>
+            </a:fillRef>
+            <a:effectRef idx="0">
+              <a:schemeClr val="accent2"/>
+            </a:effectRef>
+            <a:fontRef idx="minor">
+              <a:schemeClr val="lt1"/>
+            </a:fontRef>
+          </p:style>
+          <p:txBody>
+            <a:bodyPr rot="0" spcFirstLastPara="0" vertOverflow="overflow" horzOverflow="overflow" vert="horz" wrap="square" lIns="457119" tIns="228560" rIns="457119" bIns="228560" numCol="1" spcCol="0" rtlCol="0" fromWordArt="0" anchor="ctr" anchorCtr="0" forceAA="0" compatLnSpc="1">
+              <a:prstTxWarp prst="textNoShape">
+                <a:avLst/>
+              </a:prstTxWarp>
+              <a:noAutofit/>
+            </a:bodyPr>
+            <a:lstStyle/>
+            <a:p>
+              <a:pPr algn="ctr"/>
+              <a:endParaRPr lang="de-DE" sz="17000"/>
+            </a:p>
+          </p:txBody>
+        </p:sp>
+        <p:cxnSp>
+          <p:nvCxnSpPr>
+            <p:cNvPr id="37" name="Gerader Verbinder 36"/>
+            <p:cNvCxnSpPr/>
+            <p:nvPr/>
+          </p:nvCxnSpPr>
+          <p:spPr>
+            <a:xfrm>
+              <a:off x="588169" y="580719"/>
+              <a:ext cx="7823200" cy="7838100"/>
+            </a:xfrm>
+            <a:prstGeom prst="line">
+              <a:avLst/>
+            </a:prstGeom>
+            <a:ln w="38100">
+              <a:solidFill>
+                <a:schemeClr val="bg1"/>
+              </a:solidFill>
+            </a:ln>
+          </p:spPr>
+          <p:style>
+            <a:lnRef idx="1">
+              <a:schemeClr val="accent1"/>
+            </a:lnRef>
+            <a:fillRef idx="0">
+              <a:schemeClr val="accent1"/>
+            </a:fillRef>
+            <a:effectRef idx="0">
+              <a:schemeClr val="accent1"/>
+            </a:effectRef>
+            <a:fontRef idx="minor">
+              <a:schemeClr val="tx1"/>
+            </a:fontRef>
+          </p:style>
+        </p:cxnSp>
+        <p:cxnSp>
+          <p:nvCxnSpPr>
+            <p:cNvPr id="38" name="Gerader Verbinder 37"/>
+            <p:cNvCxnSpPr/>
+            <p:nvPr/>
+          </p:nvCxnSpPr>
+          <p:spPr>
+            <a:xfrm flipH="1">
+              <a:off x="588169" y="580719"/>
+              <a:ext cx="7823201" cy="7838100"/>
+            </a:xfrm>
+            <a:prstGeom prst="line">
+              <a:avLst/>
+            </a:prstGeom>
+            <a:ln w="38100">
+              <a:solidFill>
+                <a:schemeClr val="bg1"/>
+              </a:solidFill>
+            </a:ln>
+          </p:spPr>
+          <p:style>
+            <a:lnRef idx="1">
+              <a:schemeClr val="accent1"/>
+            </a:lnRef>
+            <a:fillRef idx="0">
+              <a:schemeClr val="accent1"/>
+            </a:fillRef>
+            <a:effectRef idx="0">
+              <a:schemeClr val="accent1"/>
+            </a:effectRef>
+            <a:fontRef idx="minor">
+              <a:schemeClr val="tx1"/>
+            </a:fontRef>
+          </p:style>
+        </p:cxnSp>
+        <p:cxnSp>
+          <p:nvCxnSpPr>
+            <p:cNvPr id="39" name="Gerader Verbinder 38"/>
+            <p:cNvCxnSpPr/>
+            <p:nvPr/>
+          </p:nvCxnSpPr>
+          <p:spPr>
+            <a:xfrm>
+              <a:off x="2879769" y="0"/>
+              <a:ext cx="0" cy="8999538"/>
+            </a:xfrm>
+            <a:prstGeom prst="line">
+              <a:avLst/>
+            </a:prstGeom>
+            <a:ln w="38100">
+              <a:solidFill>
+                <a:schemeClr val="bg1"/>
+              </a:solidFill>
+            </a:ln>
+          </p:spPr>
+          <p:style>
+            <a:lnRef idx="1">
+              <a:schemeClr val="accent1"/>
+            </a:lnRef>
+            <a:fillRef idx="0">
+              <a:schemeClr val="accent1"/>
+            </a:fillRef>
+            <a:effectRef idx="0">
+              <a:schemeClr val="accent1"/>
+            </a:effectRef>
+            <a:fontRef idx="minor">
+              <a:schemeClr val="tx1"/>
+            </a:fontRef>
+          </p:style>
+        </p:cxnSp>
+        <p:cxnSp>
+          <p:nvCxnSpPr>
+            <p:cNvPr id="40" name="Gerader Verbinder 39"/>
+            <p:cNvCxnSpPr/>
+            <p:nvPr/>
+          </p:nvCxnSpPr>
+          <p:spPr>
+            <a:xfrm>
+              <a:off x="6119769" y="0"/>
+              <a:ext cx="0" cy="8999538"/>
+            </a:xfrm>
+            <a:prstGeom prst="line">
+              <a:avLst/>
+            </a:prstGeom>
+            <a:ln w="38100">
+              <a:solidFill>
+                <a:schemeClr val="bg1"/>
+              </a:solidFill>
+            </a:ln>
+          </p:spPr>
+          <p:style>
+            <a:lnRef idx="1">
+              <a:schemeClr val="accent1"/>
+            </a:lnRef>
+            <a:fillRef idx="0">
+              <a:schemeClr val="accent1"/>
+            </a:fillRef>
+            <a:effectRef idx="0">
+              <a:schemeClr val="accent1"/>
+            </a:effectRef>
+            <a:fontRef idx="minor">
+              <a:schemeClr val="tx1"/>
+            </a:fontRef>
+          </p:style>
+        </p:cxnSp>
+        <p:cxnSp>
+          <p:nvCxnSpPr>
+            <p:cNvPr id="41" name="Gerader Verbinder 40"/>
+            <p:cNvCxnSpPr/>
+            <p:nvPr/>
+          </p:nvCxnSpPr>
+          <p:spPr>
+            <a:xfrm rot="5400000">
+              <a:off x="4499769" y="-1620000"/>
+              <a:ext cx="0" cy="8999538"/>
+            </a:xfrm>
+            <a:prstGeom prst="line">
+              <a:avLst/>
+            </a:prstGeom>
+            <a:ln w="38100">
+              <a:solidFill>
+                <a:schemeClr val="bg1"/>
+              </a:solidFill>
+            </a:ln>
+          </p:spPr>
+          <p:style>
+            <a:lnRef idx="1">
+              <a:schemeClr val="accent1"/>
+            </a:lnRef>
+            <a:fillRef idx="0">
+              <a:schemeClr val="accent1"/>
+            </a:fillRef>
+            <a:effectRef idx="0">
+              <a:schemeClr val="accent1"/>
+            </a:effectRef>
+            <a:fontRef idx="minor">
+              <a:schemeClr val="tx1"/>
+            </a:fontRef>
+          </p:style>
+        </p:cxnSp>
+        <p:cxnSp>
+          <p:nvCxnSpPr>
+            <p:cNvPr id="42" name="Gerader Verbinder 41"/>
+            <p:cNvCxnSpPr/>
+            <p:nvPr/>
+          </p:nvCxnSpPr>
+          <p:spPr>
+            <a:xfrm rot="5400000">
+              <a:off x="4499769" y="1620000"/>
+              <a:ext cx="0" cy="8999538"/>
+            </a:xfrm>
+            <a:prstGeom prst="line">
+              <a:avLst/>
+            </a:prstGeom>
+            <a:ln w="38100">
+              <a:solidFill>
+                <a:schemeClr val="bg1"/>
+              </a:solidFill>
+            </a:ln>
+          </p:spPr>
+          <p:style>
+            <a:lnRef idx="1">
+              <a:schemeClr val="accent1"/>
+            </a:lnRef>
+            <a:fillRef idx="0">
+              <a:schemeClr val="accent1"/>
+            </a:fillRef>
+            <a:effectRef idx="0">
+              <a:schemeClr val="accent1"/>
+            </a:effectRef>
+            <a:fontRef idx="minor">
+              <a:schemeClr val="tx1"/>
+            </a:fontRef>
+          </p:style>
+        </p:cxnSp>
+        <p:cxnSp>
+          <p:nvCxnSpPr>
+            <p:cNvPr id="43" name="Gerader Verbinder 42"/>
+            <p:cNvCxnSpPr/>
+            <p:nvPr/>
+          </p:nvCxnSpPr>
+          <p:spPr>
+            <a:xfrm rot="5400000">
+              <a:off x="4499769" y="-2340000"/>
+              <a:ext cx="0" cy="8999538"/>
+            </a:xfrm>
+            <a:prstGeom prst="line">
+              <a:avLst/>
+            </a:prstGeom>
+            <a:ln w="38100">
+              <a:solidFill>
+                <a:schemeClr val="bg1"/>
+              </a:solidFill>
+            </a:ln>
+          </p:spPr>
+          <p:style>
+            <a:lnRef idx="1">
+              <a:schemeClr val="accent1"/>
+            </a:lnRef>
+            <a:fillRef idx="0">
+              <a:schemeClr val="accent1"/>
+            </a:fillRef>
+            <a:effectRef idx="0">
+              <a:schemeClr val="accent1"/>
+            </a:effectRef>
+            <a:fontRef idx="minor">
+              <a:schemeClr val="tx1"/>
+            </a:fontRef>
+          </p:style>
+        </p:cxnSp>
+        <p:cxnSp>
+          <p:nvCxnSpPr>
+            <p:cNvPr id="44" name="Gerader Verbinder 43"/>
+            <p:cNvCxnSpPr/>
+            <p:nvPr/>
+          </p:nvCxnSpPr>
+          <p:spPr>
+            <a:xfrm rot="5400000">
+              <a:off x="4499769" y="2324169"/>
+              <a:ext cx="0" cy="8999538"/>
+            </a:xfrm>
+            <a:prstGeom prst="line">
+              <a:avLst/>
+            </a:prstGeom>
+            <a:ln w="38100">
+              <a:solidFill>
+                <a:schemeClr val="bg1"/>
+              </a:solidFill>
+            </a:ln>
+          </p:spPr>
+          <p:style>
+            <a:lnRef idx="1">
+              <a:schemeClr val="accent1"/>
+            </a:lnRef>
+            <a:fillRef idx="0">
+              <a:schemeClr val="accent1"/>
+            </a:fillRef>
+            <a:effectRef idx="0">
+              <a:schemeClr val="accent1"/>
+            </a:effectRef>
+            <a:fontRef idx="minor">
+              <a:schemeClr val="tx1"/>
+            </a:fontRef>
+          </p:style>
+        </p:cxnSp>
+        <p:cxnSp>
+          <p:nvCxnSpPr>
+            <p:cNvPr id="45" name="Gerader Verbinder 44"/>
+            <p:cNvCxnSpPr/>
+            <p:nvPr/>
+          </p:nvCxnSpPr>
+          <p:spPr>
+            <a:xfrm>
+              <a:off x="6841767" y="0"/>
+              <a:ext cx="0" cy="8999538"/>
+            </a:xfrm>
+            <a:prstGeom prst="line">
+              <a:avLst/>
+            </a:prstGeom>
+            <a:ln w="38100">
+              <a:solidFill>
+                <a:schemeClr val="bg1"/>
+              </a:solidFill>
+            </a:ln>
+          </p:spPr>
+          <p:style>
+            <a:lnRef idx="1">
+              <a:schemeClr val="accent1"/>
+            </a:lnRef>
+            <a:fillRef idx="0">
+              <a:schemeClr val="accent1"/>
+            </a:fillRef>
+            <a:effectRef idx="0">
+              <a:schemeClr val="accent1"/>
+            </a:effectRef>
+            <a:fontRef idx="minor">
+              <a:schemeClr val="tx1"/>
+            </a:fontRef>
+          </p:style>
+        </p:cxnSp>
+        <p:cxnSp>
+          <p:nvCxnSpPr>
+            <p:cNvPr id="46" name="Gerader Verbinder 45"/>
+            <p:cNvCxnSpPr/>
+            <p:nvPr/>
+          </p:nvCxnSpPr>
+          <p:spPr>
+            <a:xfrm>
+              <a:off x="2159769" y="0"/>
+              <a:ext cx="0" cy="8999538"/>
+            </a:xfrm>
+            <a:prstGeom prst="line">
+              <a:avLst/>
+            </a:prstGeom>
+            <a:ln w="38100">
+              <a:solidFill>
+                <a:schemeClr val="bg1"/>
+              </a:solidFill>
+            </a:ln>
+          </p:spPr>
+          <p:style>
+            <a:lnRef idx="1">
+              <a:schemeClr val="accent1"/>
+            </a:lnRef>
+            <a:fillRef idx="0">
+              <a:schemeClr val="accent1"/>
+            </a:fillRef>
+            <a:effectRef idx="0">
+              <a:schemeClr val="accent1"/>
+            </a:effectRef>
+            <a:fontRef idx="minor">
+              <a:schemeClr val="tx1"/>
+            </a:fontRef>
+          </p:style>
+        </p:cxnSp>
+        <p:cxnSp>
+          <p:nvCxnSpPr>
+            <p:cNvPr id="47" name="Gerader Verbinder 46"/>
+            <p:cNvCxnSpPr/>
+            <p:nvPr/>
+          </p:nvCxnSpPr>
+          <p:spPr>
+            <a:xfrm>
+              <a:off x="4499769" y="-1590"/>
+              <a:ext cx="0" cy="8999538"/>
+            </a:xfrm>
+            <a:prstGeom prst="line">
+              <a:avLst/>
+            </a:prstGeom>
+            <a:ln w="38100">
+              <a:solidFill>
+                <a:schemeClr val="bg1"/>
+              </a:solidFill>
+            </a:ln>
+          </p:spPr>
+          <p:style>
+            <a:lnRef idx="1">
+              <a:schemeClr val="accent1"/>
+            </a:lnRef>
+            <a:fillRef idx="0">
+              <a:schemeClr val="accent1"/>
+            </a:fillRef>
+            <a:effectRef idx="0">
+              <a:schemeClr val="accent1"/>
+            </a:effectRef>
+            <a:fontRef idx="minor">
+              <a:schemeClr val="tx1"/>
+            </a:fontRef>
+          </p:style>
+        </p:cxnSp>
+        <p:cxnSp>
+          <p:nvCxnSpPr>
+            <p:cNvPr id="48" name="Gerader Verbinder 47"/>
+            <p:cNvCxnSpPr/>
+            <p:nvPr/>
+          </p:nvCxnSpPr>
+          <p:spPr>
+            <a:xfrm rot="5400000">
+              <a:off x="4499769" y="-14107"/>
+              <a:ext cx="0" cy="8999538"/>
+            </a:xfrm>
+            <a:prstGeom prst="line">
+              <a:avLst/>
+            </a:prstGeom>
+            <a:ln w="38100">
+              <a:solidFill>
+                <a:schemeClr val="bg1"/>
+              </a:solidFill>
+            </a:ln>
+          </p:spPr>
+          <p:style>
+            <a:lnRef idx="1">
+              <a:schemeClr val="accent1"/>
+            </a:lnRef>
+            <a:fillRef idx="0">
+              <a:schemeClr val="accent1"/>
+            </a:fillRef>
+            <a:effectRef idx="0">
+              <a:schemeClr val="accent1"/>
+            </a:effectRef>
+            <a:fontRef idx="minor">
+              <a:schemeClr val="tx1"/>
+            </a:fontRef>
+          </p:style>
+        </p:cxnSp>
+      </p:grpSp>
+      <p:sp>
+        <p:nvSpPr>
+          <p:cNvPr id="36" name="Rechteck 35"/>
+          <p:cNvSpPr/>
+          <p:nvPr/>
+        </p:nvSpPr>
+        <p:spPr>
+          <a:xfrm>
+            <a:off x="0" y="0"/>
+            <a:ext cx="8999538" cy="8999538"/>
+          </a:xfrm>
+          <a:prstGeom prst="rect">
+            <a:avLst/>
+          </a:prstGeom>
+          <a:noFill/>
+          <a:ln>
+            <a:noFill/>
+          </a:ln>
+        </p:spPr>
+        <p:style>
+          <a:lnRef idx="2">
+            <a:schemeClr val="accent1">
+              <a:shade val="50000"/>
+            </a:schemeClr>
+          </a:lnRef>
+          <a:fillRef idx="1">
+            <a:schemeClr val="accent1"/>
+          </a:fillRef>
+          <a:effectRef idx="0">
+            <a:schemeClr val="accent1"/>
+          </a:effectRef>
+          <a:fontRef idx="minor">
+            <a:schemeClr val="lt1"/>
+          </a:fontRef>
+        </p:style>
+        <p:txBody>
+          <a:bodyPr rtlCol="0" anchor="ctr"/>
+          <a:lstStyle/>
+          <a:p>
+            <a:pPr algn="ctr"/>
+            <a:endParaRPr lang="de-DE" sz="1360"/>
+          </a:p>
+        </p:txBody>
+      </p:sp>
+      <p:grpSp>
+        <p:nvGrpSpPr>
+          <p:cNvPr id="2" name="Group 1"/>
+          <p:cNvGrpSpPr/>
+          <p:nvPr/>
+        </p:nvGrpSpPr>
+        <p:grpSpPr>
+          <a:xfrm>
+            <a:off x="1203776" y="1117467"/>
+            <a:ext cx="6591985" cy="6767784"/>
+            <a:chOff x="2812846" y="1935553"/>
+            <a:chExt cx="2112974" cy="2169324"/>
+          </a:xfrm>
+        </p:grpSpPr>
+        <p:sp>
+          <p:nvSpPr>
+            <p:cNvPr id="16" name="Abgerundetes Rechteck 15"/>
+            <p:cNvSpPr/>
+            <p:nvPr/>
+          </p:nvSpPr>
+          <p:spPr>
+            <a:xfrm>
+              <a:off x="2812846" y="1935553"/>
+              <a:ext cx="852099" cy="852099"/>
+            </a:xfrm>
+            <a:prstGeom prst="roundRect">
+              <a:avLst>
+                <a:gd name="adj" fmla="val 19115"/>
+              </a:avLst>
+            </a:prstGeom>
+            <a:solidFill>
+              <a:srgbClr val="4CD964"/>
+            </a:solidFill>
+            <a:ln>
+              <a:noFill/>
+            </a:ln>
+          </p:spPr>
+          <p:style>
+            <a:lnRef idx="2">
+              <a:schemeClr val="accent6">
+                <a:shade val="50000"/>
+              </a:schemeClr>
+            </a:lnRef>
+            <a:fillRef idx="1">
+              <a:schemeClr val="accent6"/>
+            </a:fillRef>
+            <a:effectRef idx="0">
+              <a:schemeClr val="accent6"/>
+            </a:effectRef>
+            <a:fontRef idx="minor">
+              <a:schemeClr val="lt1"/>
+            </a:fontRef>
+          </p:style>
+          <p:txBody>
+            <a:bodyPr rot="0" spcFirstLastPara="0" vertOverflow="overflow" horzOverflow="overflow" vert="horz" wrap="square" lIns="457119" tIns="228560" rIns="457119" bIns="228560" numCol="1" spcCol="0" rtlCol="0" fromWordArt="0" anchor="ctr" anchorCtr="0" forceAA="0" compatLnSpc="1">
+              <a:prstTxWarp prst="textNoShape">
+                <a:avLst/>
+              </a:prstTxWarp>
+              <a:noAutofit/>
+            </a:bodyPr>
+            <a:lstStyle/>
+            <a:p>
+              <a:pPr algn="ctr"/>
+              <a:endParaRPr lang="de-DE" sz="17000"/>
+            </a:p>
+          </p:txBody>
+        </p:sp>
+        <p:sp>
+          <p:nvSpPr>
+            <p:cNvPr id="19" name="Abgerundetes Rechteck 18"/>
+            <p:cNvSpPr/>
+            <p:nvPr/>
+          </p:nvSpPr>
+          <p:spPr>
+            <a:xfrm rot="2700000">
+              <a:off x="4073721" y="1935553"/>
+              <a:ext cx="852099" cy="852099"/>
+            </a:xfrm>
+            <a:prstGeom prst="roundRect">
+              <a:avLst>
+                <a:gd name="adj" fmla="val 19115"/>
+              </a:avLst>
+            </a:prstGeom>
+            <a:solidFill>
+              <a:srgbClr val="FF2D55"/>
+            </a:solidFill>
+            <a:ln>
+              <a:noFill/>
+            </a:ln>
+          </p:spPr>
+          <p:style>
+            <a:lnRef idx="2">
+              <a:schemeClr val="accent6">
+                <a:shade val="50000"/>
+              </a:schemeClr>
+            </a:lnRef>
+            <a:fillRef idx="1">
+              <a:schemeClr val="accent6"/>
+            </a:fillRef>
+            <a:effectRef idx="0">
+              <a:schemeClr val="accent6"/>
+            </a:effectRef>
+            <a:fontRef idx="minor">
+              <a:schemeClr val="lt1"/>
+            </a:fontRef>
+          </p:style>
+          <p:txBody>
+            <a:bodyPr rot="0" spcFirstLastPara="0" vertOverflow="overflow" horzOverflow="overflow" vert="horz" wrap="square" lIns="457119" tIns="228560" rIns="457119" bIns="228560" numCol="1" spcCol="0" rtlCol="0" fromWordArt="0" anchor="ctr" anchorCtr="0" forceAA="0" compatLnSpc="1">
+              <a:prstTxWarp prst="textNoShape">
+                <a:avLst/>
+              </a:prstTxWarp>
+              <a:noAutofit/>
+            </a:bodyPr>
+            <a:lstStyle/>
+            <a:p>
+              <a:pPr algn="ctr"/>
+              <a:endParaRPr lang="de-DE" sz="17000"/>
+            </a:p>
+          </p:txBody>
+        </p:sp>
+        <p:sp>
+          <p:nvSpPr>
+            <p:cNvPr id="25" name="Abgerundetes Rechteck 24"/>
+            <p:cNvSpPr/>
+            <p:nvPr/>
+          </p:nvSpPr>
+          <p:spPr>
+            <a:xfrm>
+              <a:off x="2812846" y="3252778"/>
+              <a:ext cx="852099" cy="852099"/>
+            </a:xfrm>
+            <a:prstGeom prst="roundRect">
+              <a:avLst>
+                <a:gd name="adj" fmla="val 19115"/>
+              </a:avLst>
+            </a:prstGeom>
+            <a:solidFill>
+              <a:srgbClr val="FF9500"/>
+            </a:solidFill>
+            <a:ln>
+              <a:noFill/>
+            </a:ln>
+          </p:spPr>
+          <p:style>
+            <a:lnRef idx="2">
+              <a:schemeClr val="accent6">
+                <a:shade val="50000"/>
+              </a:schemeClr>
+            </a:lnRef>
+            <a:fillRef idx="1">
+              <a:schemeClr val="accent6"/>
+            </a:fillRef>
+            <a:effectRef idx="0">
+              <a:schemeClr val="accent6"/>
+            </a:effectRef>
+            <a:fontRef idx="minor">
+              <a:schemeClr val="lt1"/>
+            </a:fontRef>
+          </p:style>
+          <p:txBody>
+            <a:bodyPr rot="0" spcFirstLastPara="0" vertOverflow="overflow" horzOverflow="overflow" vert="horz" wrap="square" lIns="457119" tIns="228560" rIns="457119" bIns="228560" numCol="1" spcCol="0" rtlCol="0" fromWordArt="0" anchor="ctr" anchorCtr="0" forceAA="0" compatLnSpc="1">
+              <a:prstTxWarp prst="textNoShape">
+                <a:avLst/>
+              </a:prstTxWarp>
+              <a:noAutofit/>
+            </a:bodyPr>
+            <a:lstStyle/>
+            <a:p>
+              <a:pPr algn="ctr"/>
+              <a:endParaRPr lang="de-DE" sz="17000"/>
+            </a:p>
+          </p:txBody>
+        </p:sp>
+        <p:sp>
+          <p:nvSpPr>
+            <p:cNvPr id="27" name="Abgerundetes Rechteck 26"/>
+            <p:cNvSpPr/>
+            <p:nvPr/>
+          </p:nvSpPr>
+          <p:spPr>
+            <a:xfrm>
+              <a:off x="4073721" y="3252778"/>
+              <a:ext cx="852099" cy="852099"/>
+            </a:xfrm>
+            <a:prstGeom prst="roundRect">
+              <a:avLst>
+                <a:gd name="adj" fmla="val 19115"/>
+              </a:avLst>
+            </a:prstGeom>
+            <a:solidFill>
+              <a:srgbClr val="007AFF"/>
+            </a:solidFill>
+            <a:ln>
+              <a:noFill/>
+            </a:ln>
+          </p:spPr>
+          <p:style>
+            <a:lnRef idx="2">
+              <a:schemeClr val="accent6">
+                <a:shade val="50000"/>
+              </a:schemeClr>
+            </a:lnRef>
+            <a:fillRef idx="1">
+              <a:schemeClr val="accent6"/>
+            </a:fillRef>
+            <a:effectRef idx="0">
+              <a:schemeClr val="accent6"/>
+            </a:effectRef>
+            <a:fontRef idx="minor">
+              <a:schemeClr val="lt1"/>
+            </a:fontRef>
+          </p:style>
+          <p:txBody>
+            <a:bodyPr rot="0" spcFirstLastPara="0" vertOverflow="overflow" horzOverflow="overflow" vert="horz" wrap="square" lIns="457119" tIns="228560" rIns="457119" bIns="228560" numCol="1" spcCol="0" rtlCol="0" fromWordArt="0" anchor="ctr" anchorCtr="0" forceAA="0" compatLnSpc="1">
+              <a:prstTxWarp prst="textNoShape">
+                <a:avLst/>
+              </a:prstTxWarp>
+              <a:noAutofit/>
+            </a:bodyPr>
+            <a:lstStyle/>
+            <a:p>
+              <a:pPr algn="ctr"/>
+              <a:endParaRPr lang="de-DE" sz="17000"/>
+            </a:p>
+          </p:txBody>
+        </p:sp>
+      </p:grpSp>
+    </p:spTree>
+    <p:extLst>
+      <p:ext uri="{BB962C8B-B14F-4D97-AF65-F5344CB8AC3E}">
+        <p14:creationId xmlns:p14="http://schemas.microsoft.com/office/powerpoint/2010/main" xmlns="" val="249076851"/>
       </p:ext>
     </p:extLst>
   </p:cSld>
@@ -5579,7 +6693,7 @@
     </a:clrScheme>
     <a:fontScheme name="Office Theme">
       <a:majorFont>
-        <a:latin typeface="Calibri Light" panose="020F0302020204030204"/>
+        <a:latin typeface="Calibri Light"/>
         <a:ea typeface=""/>
         <a:cs typeface=""/>
         <a:font script="Jpan" typeface="ＭＳ Ｐゴシック"/>
@@ -5614,7 +6728,7 @@
         <a:font script="Geor" typeface="Sylfaen"/>
       </a:majorFont>
       <a:minorFont>
-        <a:latin typeface="Calibri" panose="020F0502020204030204"/>
+        <a:latin typeface="Calibri"/>
         <a:ea typeface=""/>
         <a:cs typeface=""/>
         <a:font script="Jpan" typeface="ＭＳ Ｐゴシック"/>
@@ -5791,7 +6905,7 @@
   <a:extraClrSchemeLst/>
   <a:extLst>
     <a:ext uri="{05A4C25C-085E-4340-85A3-A5531E510DB2}">
-      <thm15:themeFamily xmlns:thm15="http://schemas.microsoft.com/office/thememl/2012/main" xmlns="" name="Office Theme" id="{62F939B6-93AF-4DB8-9C6B-D6C7DFDC589F}" vid="{4A3C46E8-61CC-4603-A589-7422A47A8E4A}"/>
+      <thm15:themeFamily xmlns="" xmlns:thm15="http://schemas.microsoft.com/office/thememl/2012/main" name="Office Theme" id="{62F939B6-93AF-4DB8-9C6B-D6C7DFDC589F}" vid="{4A3C46E8-61CC-4603-A589-7422A47A8E4A}"/>
     </a:ext>
   </a:extLst>
 </a:theme>

</xml_diff>